<commit_message>
Deck updates - test structure, story
Added the AAA structure slide.
Added the beginnings of a story
</commit_message>
<xml_diff>
--- a/DB-Delivery-Get-Testing-TSQL.pptx
+++ b/DB-Delivery-Get-Testing-TSQL.pptx
@@ -8,7 +8,7 @@
     <p:sldMasterId id="2147483684" r:id="rId4"/>
   </p:sldMasterIdLst>
   <p:notesMasterIdLst>
-    <p:notesMasterId r:id="rId38"/>
+    <p:notesMasterId r:id="rId39"/>
   </p:notesMasterIdLst>
   <p:sldIdLst>
     <p:sldId id="291" r:id="rId5"/>
@@ -25,25 +25,26 @@
     <p:sldId id="261" r:id="rId16"/>
     <p:sldId id="285" r:id="rId17"/>
     <p:sldId id="260" r:id="rId18"/>
-    <p:sldId id="264" r:id="rId19"/>
-    <p:sldId id="263" r:id="rId20"/>
-    <p:sldId id="262" r:id="rId21"/>
-    <p:sldId id="269" r:id="rId22"/>
-    <p:sldId id="272" r:id="rId23"/>
-    <p:sldId id="273" r:id="rId24"/>
-    <p:sldId id="274" r:id="rId25"/>
-    <p:sldId id="275" r:id="rId26"/>
-    <p:sldId id="276" r:id="rId27"/>
-    <p:sldId id="278" r:id="rId28"/>
-    <p:sldId id="277" r:id="rId29"/>
-    <p:sldId id="270" r:id="rId30"/>
-    <p:sldId id="271" r:id="rId31"/>
-    <p:sldId id="287" r:id="rId32"/>
-    <p:sldId id="265" r:id="rId33"/>
-    <p:sldId id="258" r:id="rId34"/>
-    <p:sldId id="259" r:id="rId35"/>
-    <p:sldId id="266" r:id="rId36"/>
-    <p:sldId id="267" r:id="rId37"/>
+    <p:sldId id="293" r:id="rId19"/>
+    <p:sldId id="264" r:id="rId20"/>
+    <p:sldId id="263" r:id="rId21"/>
+    <p:sldId id="262" r:id="rId22"/>
+    <p:sldId id="269" r:id="rId23"/>
+    <p:sldId id="272" r:id="rId24"/>
+    <p:sldId id="273" r:id="rId25"/>
+    <p:sldId id="274" r:id="rId26"/>
+    <p:sldId id="275" r:id="rId27"/>
+    <p:sldId id="276" r:id="rId28"/>
+    <p:sldId id="278" r:id="rId29"/>
+    <p:sldId id="277" r:id="rId30"/>
+    <p:sldId id="270" r:id="rId31"/>
+    <p:sldId id="271" r:id="rId32"/>
+    <p:sldId id="287" r:id="rId33"/>
+    <p:sldId id="265" r:id="rId34"/>
+    <p:sldId id="258" r:id="rId35"/>
+    <p:sldId id="259" r:id="rId36"/>
+    <p:sldId id="266" r:id="rId37"/>
+    <p:sldId id="267" r:id="rId38"/>
   </p:sldIdLst>
   <p:sldSz cx="12192000" cy="6858000"/>
   <p:notesSz cx="6858000" cy="9144000"/>
@@ -144,7 +145,7 @@
   </p:defaultTextStyle>
   <p:extLst>
     <p:ext uri="{EFAFB233-063F-42B5-8137-9DF3F51BA10A}">
-      <p15:sldGuideLst xmlns:p15="http://schemas.microsoft.com/office/powerpoint/2012/main">
+      <p15:sldGuideLst xmlns:p15="http://schemas.microsoft.com/office/powerpoint/2012/main" xmlns="">
         <p15:guide id="1" orient="horz" pos="2160" userDrawn="1">
           <p15:clr>
             <a:srgbClr val="A4A3A4"/>
@@ -6656,45 +6657,45 @@
     </dgm:pt>
   </dgm:ptLst>
   <dgm:cxnLst>
+    <dgm:cxn modelId="{1965AC51-E6BB-4350-A645-47C0813ACC25}" srcId="{2548F702-1E66-46B5-9ABC-6AB759D5FB8B}" destId="{6828C8CB-43B5-4266-8540-50DF4A7CE478}" srcOrd="2" destOrd="0" parTransId="{DBB32007-D7D1-4235-AF2F-26753076DD1F}" sibTransId="{34032CCF-9005-477B-8CE1-C04720CC1B51}"/>
+    <dgm:cxn modelId="{5162597F-629A-4AB6-989A-CA90A736A17A}" type="presOf" srcId="{4B7FD7B1-80C6-4D61-9C5D-E8E4B5CDF140}" destId="{7C3DC7B1-1D6E-4455-B112-FFB8EC0A4734}" srcOrd="0" destOrd="0" presId="urn:microsoft.com/office/officeart/2005/8/layout/hProcess9"/>
+    <dgm:cxn modelId="{848CB416-1BC8-431C-A0B0-1A297CAA0C8A}" type="presOf" srcId="{96566F36-C677-494B-802B-E321CCEFDD3F}" destId="{8507952A-1E94-467D-B948-0A321F24253C}" srcOrd="0" destOrd="1" presId="urn:microsoft.com/office/officeart/2005/8/layout/hProcess9"/>
+    <dgm:cxn modelId="{C32C55F6-70B1-4605-B5B6-C29D1E90122A}" type="presOf" srcId="{2548F702-1E66-46B5-9ABC-6AB759D5FB8B}" destId="{C9581C09-77CE-4113-A727-C2C15E28AEB3}" srcOrd="0" destOrd="0" presId="urn:microsoft.com/office/officeart/2005/8/layout/hProcess9"/>
+    <dgm:cxn modelId="{CD443531-386C-4938-BA42-67C07E45F50F}" type="presOf" srcId="{76A909F4-06BA-4113-B4E7-7E1E8E3A43D2}" destId="{8507952A-1E94-467D-B948-0A321F24253C}" srcOrd="0" destOrd="3" presId="urn:microsoft.com/office/officeart/2005/8/layout/hProcess9"/>
+    <dgm:cxn modelId="{F9692805-72C0-4451-8CAA-BFBCC78C1B4F}" srcId="{0CE19505-E527-44F5-9B78-63CAD7F2C92C}" destId="{89CCD24F-B0E7-4BE6-AFBB-69918AC636CA}" srcOrd="2" destOrd="0" parTransId="{A996C48C-5ACD-46D1-BB85-663B1EBE8F3E}" sibTransId="{DE4F116E-9239-4925-8EDE-421C5A2CDDDC}"/>
+    <dgm:cxn modelId="{B0E8F0E5-7FAA-4B6D-B99F-8C5E3029DCF7}" type="presOf" srcId="{9831EE05-56A0-4624-BE28-3391F3ED382C}" destId="{2F4EC6A7-3F18-4C8F-B73E-406B343EEC5D}" srcOrd="0" destOrd="4" presId="urn:microsoft.com/office/officeart/2005/8/layout/hProcess9"/>
+    <dgm:cxn modelId="{C82F5FA1-9696-43CD-8C2D-F5A6AF1B0899}" type="presOf" srcId="{07BA4662-2877-4706-8B15-70BECE5A088D}" destId="{662950D7-268F-48DD-A417-A8B5FEAB54E6}" srcOrd="0" destOrd="0" presId="urn:microsoft.com/office/officeart/2005/8/layout/hProcess9"/>
+    <dgm:cxn modelId="{1009F17F-90B8-4FC8-B36B-B7411DE10B2F}" srcId="{3B52B5AC-6D41-4359-8DD1-2BE71A3CCB59}" destId="{96566F36-C677-494B-802B-E321CCEFDD3F}" srcOrd="0" destOrd="0" parTransId="{9C5D248A-3ED6-4816-B0E0-B73F510FB1F4}" sibTransId="{ACE7F517-28CF-49FB-8716-79F32F3603E7}"/>
+    <dgm:cxn modelId="{9659B677-EE68-4892-94B6-3F21D7E708C2}" type="presOf" srcId="{79615B41-F057-4216-ABE0-A7619A6A00EB}" destId="{72B9532E-95F7-4D64-9D7D-5DA593B79D93}" srcOrd="0" destOrd="0" presId="urn:microsoft.com/office/officeart/2005/8/layout/hProcess9"/>
+    <dgm:cxn modelId="{8733AFC6-CECC-409F-89C2-02B7B9C74E3A}" type="presOf" srcId="{D2B32A0E-0716-4FAE-9A5D-E301162960D9}" destId="{662950D7-268F-48DD-A417-A8B5FEAB54E6}" srcOrd="0" destOrd="1" presId="urn:microsoft.com/office/officeart/2005/8/layout/hProcess9"/>
+    <dgm:cxn modelId="{14FF0A94-2EEB-47AC-BC81-375AD19881ED}" srcId="{0CE19505-E527-44F5-9B78-63CAD7F2C92C}" destId="{3B52B5AC-6D41-4359-8DD1-2BE71A3CCB59}" srcOrd="4" destOrd="0" parTransId="{1A1EE3AA-B3D0-498C-B40A-199637014D7D}" sibTransId="{428AC4C3-FB35-4270-AFEA-E8B9B623BCA3}"/>
+    <dgm:cxn modelId="{DF816D2D-EF45-4472-9BBA-80701F27BD02}" type="presOf" srcId="{01324C8E-7505-48B5-82E1-C7B2B6946093}" destId="{662950D7-268F-48DD-A417-A8B5FEAB54E6}" srcOrd="0" destOrd="2" presId="urn:microsoft.com/office/officeart/2005/8/layout/hProcess9"/>
+    <dgm:cxn modelId="{3DE3E2D7-55E3-468F-B59D-8A6271228D79}" type="presOf" srcId="{89CCD24F-B0E7-4BE6-AFBB-69918AC636CA}" destId="{2F4EC6A7-3F18-4C8F-B73E-406B343EEC5D}" srcOrd="0" destOrd="0" presId="urn:microsoft.com/office/officeart/2005/8/layout/hProcess9"/>
+    <dgm:cxn modelId="{B5118A0E-CEAA-4885-947F-AAF8250F203F}" srcId="{0CE19505-E527-44F5-9B78-63CAD7F2C92C}" destId="{A06C0772-EB4B-4520-A051-FD8F1570906C}" srcOrd="0" destOrd="0" parTransId="{EA34971E-4A19-4FF4-9294-F0C5049BB0EE}" sibTransId="{EB52F477-5A61-4620-994B-A9560FFD8D2B}"/>
+    <dgm:cxn modelId="{03531E5C-0151-4FD3-8A77-4327BA71DDF2}" srcId="{89CCD24F-B0E7-4BE6-AFBB-69918AC636CA}" destId="{9831EE05-56A0-4624-BE28-3391F3ED382C}" srcOrd="3" destOrd="0" parTransId="{185DFC97-0DC8-4D98-8479-0AACA68D19A2}" sibTransId="{4CF0707B-3284-4E34-B619-B8489DA3E0F1}"/>
+    <dgm:cxn modelId="{AA6638A7-2004-4AD4-8FCF-303787E979B5}" srcId="{89CCD24F-B0E7-4BE6-AFBB-69918AC636CA}" destId="{A62816C7-87E1-4B6D-8170-A03B59E00E7D}" srcOrd="0" destOrd="0" parTransId="{6C5CBBFA-7FB0-4D88-B698-6E6596C20F27}" sibTransId="{CBBF12B0-646B-4D61-AC2D-24642774C2D7}"/>
+    <dgm:cxn modelId="{CE67A9F7-F573-41A1-8034-DEEBC0E42104}" type="presOf" srcId="{6828C8CB-43B5-4266-8540-50DF4A7CE478}" destId="{C9581C09-77CE-4113-A727-C2C15E28AEB3}" srcOrd="0" destOrd="3" presId="urn:microsoft.com/office/officeart/2005/8/layout/hProcess9"/>
+    <dgm:cxn modelId="{758D754C-6D32-419D-BD92-5DF33D0EFE21}" srcId="{07BA4662-2877-4706-8B15-70BECE5A088D}" destId="{D2B32A0E-0716-4FAE-9A5D-E301162960D9}" srcOrd="0" destOrd="0" parTransId="{D960F4E1-6BC3-44C2-84CD-A63F526C1377}" sibTransId="{1412E769-4308-4D52-8641-37C954431D4A}"/>
+    <dgm:cxn modelId="{4294350E-6B4A-4D68-8807-55E8C2E297E3}" srcId="{89CCD24F-B0E7-4BE6-AFBB-69918AC636CA}" destId="{C023FF99-D9FD-4B49-A88B-01BCF7A49C9F}" srcOrd="2" destOrd="0" parTransId="{39DE6B66-13AA-4E17-9976-D8C78F8396B7}" sibTransId="{C3D96D10-02BE-48F8-B32F-88F9D24CF0B8}"/>
+    <dgm:cxn modelId="{D68AF3BF-0603-4B94-BA92-C66CC01B6184}" srcId="{07BA4662-2877-4706-8B15-70BECE5A088D}" destId="{01324C8E-7505-48B5-82E1-C7B2B6946093}" srcOrd="1" destOrd="0" parTransId="{478BAD4B-83B8-4C23-81C3-A615F6674249}" sibTransId="{9DC9D054-72B7-4EA6-BD6E-5F0F92555D6E}"/>
+    <dgm:cxn modelId="{DE47F4F0-03BB-4A06-963C-30EBE4D4992A}" srcId="{3B52B5AC-6D41-4359-8DD1-2BE71A3CCB59}" destId="{76A909F4-06BA-4113-B4E7-7E1E8E3A43D2}" srcOrd="2" destOrd="0" parTransId="{421A1E6A-9E59-4069-B3A8-1F72A9A1FB6E}" sibTransId="{0EF0407B-D115-469E-BA40-1334B8D820F5}"/>
+    <dgm:cxn modelId="{45DBEE7E-54DD-4D21-A076-D208089D7670}" type="presOf" srcId="{19FB6450-4E26-4AFE-B85A-027ADE879B2C}" destId="{C9581C09-77CE-4113-A727-C2C15E28AEB3}" srcOrd="0" destOrd="2" presId="urn:microsoft.com/office/officeart/2005/8/layout/hProcess9"/>
+    <dgm:cxn modelId="{301EF1DD-5176-4B5E-A9E2-4CD5F0DAF81D}" type="presOf" srcId="{A62816C7-87E1-4B6D-8170-A03B59E00E7D}" destId="{2F4EC6A7-3F18-4C8F-B73E-406B343EEC5D}" srcOrd="0" destOrd="1" presId="urn:microsoft.com/office/officeart/2005/8/layout/hProcess9"/>
+    <dgm:cxn modelId="{A1C64B13-490C-4DF4-9EAA-353B45AA3C16}" srcId="{89CCD24F-B0E7-4BE6-AFBB-69918AC636CA}" destId="{592F4F55-0D78-4348-AC3F-35448EFB8008}" srcOrd="1" destOrd="0" parTransId="{D8FDD8CE-1BDC-468E-9273-777562710EDB}" sibTransId="{AF5F3E5E-B8A8-4390-B181-739919934DD6}"/>
+    <dgm:cxn modelId="{FDDA1E25-7A08-42FB-B3F2-6E161F1E0B3B}" type="presOf" srcId="{CFFE6439-16EE-455B-97C7-BA683E5C6C92}" destId="{8507952A-1E94-467D-B948-0A321F24253C}" srcOrd="0" destOrd="2" presId="urn:microsoft.com/office/officeart/2005/8/layout/hProcess9"/>
     <dgm:cxn modelId="{5F0D655A-B38F-4D96-9AAD-CAD085EA10A5}" srcId="{0CE19505-E527-44F5-9B78-63CAD7F2C92C}" destId="{2548F702-1E66-46B5-9ABC-6AB759D5FB8B}" srcOrd="6" destOrd="0" parTransId="{B4559846-0356-4C71-BED4-4E47BB07C76C}" sibTransId="{A55AE104-BFD0-4DC1-A702-76267FA70470}"/>
+    <dgm:cxn modelId="{D0609B39-AD03-43EE-A1E7-05636C927216}" type="presOf" srcId="{592F4F55-0D78-4348-AC3F-35448EFB8008}" destId="{2F4EC6A7-3F18-4C8F-B73E-406B343EEC5D}" srcOrd="0" destOrd="2" presId="urn:microsoft.com/office/officeart/2005/8/layout/hProcess9"/>
+    <dgm:cxn modelId="{D713D93E-ADD7-4532-8677-9A5A4E94425D}" srcId="{3B52B5AC-6D41-4359-8DD1-2BE71A3CCB59}" destId="{CFFE6439-16EE-455B-97C7-BA683E5C6C92}" srcOrd="1" destOrd="0" parTransId="{4B293F50-D806-4AE9-8470-EEFD89ACDE79}" sibTransId="{F01C7ABC-4524-40C8-8511-821C918D2200}"/>
+    <dgm:cxn modelId="{26F3CB22-97E1-4114-A0F7-91F663100A11}" type="presOf" srcId="{B2B5CACB-4AB1-4E87-80E7-580337C28B1F}" destId="{C9581C09-77CE-4113-A727-C2C15E28AEB3}" srcOrd="0" destOrd="1" presId="urn:microsoft.com/office/officeart/2005/8/layout/hProcess9"/>
+    <dgm:cxn modelId="{4666DE3B-CB84-4FEB-B337-04493CC25E88}" srcId="{2548F702-1E66-46B5-9ABC-6AB759D5FB8B}" destId="{19FB6450-4E26-4AFE-B85A-027ADE879B2C}" srcOrd="1" destOrd="0" parTransId="{85899F9B-50D3-47C5-9E18-3A323967E3EF}" sibTransId="{CCC48E57-F303-4574-8BDE-7B1A1D9C4F2E}"/>
+    <dgm:cxn modelId="{4448028F-3C19-43D0-8717-AEFFAF044818}" srcId="{2548F702-1E66-46B5-9ABC-6AB759D5FB8B}" destId="{B2B5CACB-4AB1-4E87-80E7-580337C28B1F}" srcOrd="0" destOrd="0" parTransId="{25D45EF5-5F37-44AA-B30D-D01015DA2C29}" sibTransId="{91B67D83-1248-4FCF-A676-74592964CEFF}"/>
+    <dgm:cxn modelId="{58E23D1F-3720-4E28-AFEC-915634B38EF7}" srcId="{0CE19505-E527-44F5-9B78-63CAD7F2C92C}" destId="{79615B41-F057-4216-ABE0-A7619A6A00EB}" srcOrd="1" destOrd="0" parTransId="{D2F7D3A0-76BC-458A-B3F0-D44F6C92414B}" sibTransId="{9EFCD8A1-573D-415C-B553-544FFEEFCCF4}"/>
+    <dgm:cxn modelId="{35FF2E88-9048-4AB1-8B2F-331440A25FF4}" srcId="{0CE19505-E527-44F5-9B78-63CAD7F2C92C}" destId="{07BA4662-2877-4706-8B15-70BECE5A088D}" srcOrd="3" destOrd="0" parTransId="{2EFB02A5-04F0-4F69-A652-3F40D7C409C3}" sibTransId="{0BB11E57-7AD1-4AA8-8531-E5A587F3DD83}"/>
+    <dgm:cxn modelId="{919B43A5-D0F6-45BA-AC1B-7BDC103DFFCF}" type="presOf" srcId="{3B52B5AC-6D41-4359-8DD1-2BE71A3CCB59}" destId="{8507952A-1E94-467D-B948-0A321F24253C}" srcOrd="0" destOrd="0" presId="urn:microsoft.com/office/officeart/2005/8/layout/hProcess9"/>
+    <dgm:cxn modelId="{CEB6F37E-8BD9-4E09-8245-4CBF3F472CA0}" type="presOf" srcId="{0CE19505-E527-44F5-9B78-63CAD7F2C92C}" destId="{95E47628-2374-4318-ABF1-BD44693D8A7E}" srcOrd="0" destOrd="0" presId="urn:microsoft.com/office/officeart/2005/8/layout/hProcess9"/>
+    <dgm:cxn modelId="{B5B44C67-DD43-4506-9120-CD5C33C4F49F}" srcId="{0CE19505-E527-44F5-9B78-63CAD7F2C92C}" destId="{4B7FD7B1-80C6-4D61-9C5D-E8E4B5CDF140}" srcOrd="5" destOrd="0" parTransId="{47E3B511-20C9-4993-893C-0275ADF9E2D3}" sibTransId="{7EB869F4-790E-4616-9B89-3D9408845640}"/>
     <dgm:cxn modelId="{3BF5928D-79D8-4548-ADE4-AC8F1837FEBB}" type="presOf" srcId="{C023FF99-D9FD-4B49-A88B-01BCF7A49C9F}" destId="{2F4EC6A7-3F18-4C8F-B73E-406B343EEC5D}" srcOrd="0" destOrd="3" presId="urn:microsoft.com/office/officeart/2005/8/layout/hProcess9"/>
-    <dgm:cxn modelId="{FDDA1E25-7A08-42FB-B3F2-6E161F1E0B3B}" type="presOf" srcId="{CFFE6439-16EE-455B-97C7-BA683E5C6C92}" destId="{8507952A-1E94-467D-B948-0A321F24253C}" srcOrd="0" destOrd="2" presId="urn:microsoft.com/office/officeart/2005/8/layout/hProcess9"/>
-    <dgm:cxn modelId="{B5B44C67-DD43-4506-9120-CD5C33C4F49F}" srcId="{0CE19505-E527-44F5-9B78-63CAD7F2C92C}" destId="{4B7FD7B1-80C6-4D61-9C5D-E8E4B5CDF140}" srcOrd="5" destOrd="0" parTransId="{47E3B511-20C9-4993-893C-0275ADF9E2D3}" sibTransId="{7EB869F4-790E-4616-9B89-3D9408845640}"/>
-    <dgm:cxn modelId="{C32C55F6-70B1-4605-B5B6-C29D1E90122A}" type="presOf" srcId="{2548F702-1E66-46B5-9ABC-6AB759D5FB8B}" destId="{C9581C09-77CE-4113-A727-C2C15E28AEB3}" srcOrd="0" destOrd="0" presId="urn:microsoft.com/office/officeart/2005/8/layout/hProcess9"/>
-    <dgm:cxn modelId="{03531E5C-0151-4FD3-8A77-4327BA71DDF2}" srcId="{89CCD24F-B0E7-4BE6-AFBB-69918AC636CA}" destId="{9831EE05-56A0-4624-BE28-3391F3ED382C}" srcOrd="3" destOrd="0" parTransId="{185DFC97-0DC8-4D98-8479-0AACA68D19A2}" sibTransId="{4CF0707B-3284-4E34-B619-B8489DA3E0F1}"/>
-    <dgm:cxn modelId="{58E23D1F-3720-4E28-AFEC-915634B38EF7}" srcId="{0CE19505-E527-44F5-9B78-63CAD7F2C92C}" destId="{79615B41-F057-4216-ABE0-A7619A6A00EB}" srcOrd="1" destOrd="0" parTransId="{D2F7D3A0-76BC-458A-B3F0-D44F6C92414B}" sibTransId="{9EFCD8A1-573D-415C-B553-544FFEEFCCF4}"/>
-    <dgm:cxn modelId="{CEB6F37E-8BD9-4E09-8245-4CBF3F472CA0}" type="presOf" srcId="{0CE19505-E527-44F5-9B78-63CAD7F2C92C}" destId="{95E47628-2374-4318-ABF1-BD44693D8A7E}" srcOrd="0" destOrd="0" presId="urn:microsoft.com/office/officeart/2005/8/layout/hProcess9"/>
-    <dgm:cxn modelId="{C82F5FA1-9696-43CD-8C2D-F5A6AF1B0899}" type="presOf" srcId="{07BA4662-2877-4706-8B15-70BECE5A088D}" destId="{662950D7-268F-48DD-A417-A8B5FEAB54E6}" srcOrd="0" destOrd="0" presId="urn:microsoft.com/office/officeart/2005/8/layout/hProcess9"/>
-    <dgm:cxn modelId="{4448028F-3C19-43D0-8717-AEFFAF044818}" srcId="{2548F702-1E66-46B5-9ABC-6AB759D5FB8B}" destId="{B2B5CACB-4AB1-4E87-80E7-580337C28B1F}" srcOrd="0" destOrd="0" parTransId="{25D45EF5-5F37-44AA-B30D-D01015DA2C29}" sibTransId="{91B67D83-1248-4FCF-A676-74592964CEFF}"/>
-    <dgm:cxn modelId="{301EF1DD-5176-4B5E-A9E2-4CD5F0DAF81D}" type="presOf" srcId="{A62816C7-87E1-4B6D-8170-A03B59E00E7D}" destId="{2F4EC6A7-3F18-4C8F-B73E-406B343EEC5D}" srcOrd="0" destOrd="1" presId="urn:microsoft.com/office/officeart/2005/8/layout/hProcess9"/>
-    <dgm:cxn modelId="{45DBEE7E-54DD-4D21-A076-D208089D7670}" type="presOf" srcId="{19FB6450-4E26-4AFE-B85A-027ADE879B2C}" destId="{C9581C09-77CE-4113-A727-C2C15E28AEB3}" srcOrd="0" destOrd="2" presId="urn:microsoft.com/office/officeart/2005/8/layout/hProcess9"/>
-    <dgm:cxn modelId="{F9692805-72C0-4451-8CAA-BFBCC78C1B4F}" srcId="{0CE19505-E527-44F5-9B78-63CAD7F2C92C}" destId="{89CCD24F-B0E7-4BE6-AFBB-69918AC636CA}" srcOrd="2" destOrd="0" parTransId="{A996C48C-5ACD-46D1-BB85-663B1EBE8F3E}" sibTransId="{DE4F116E-9239-4925-8EDE-421C5A2CDDDC}"/>
-    <dgm:cxn modelId="{9659B677-EE68-4892-94B6-3F21D7E708C2}" type="presOf" srcId="{79615B41-F057-4216-ABE0-A7619A6A00EB}" destId="{72B9532E-95F7-4D64-9D7D-5DA593B79D93}" srcOrd="0" destOrd="0" presId="urn:microsoft.com/office/officeart/2005/8/layout/hProcess9"/>
-    <dgm:cxn modelId="{5162597F-629A-4AB6-989A-CA90A736A17A}" type="presOf" srcId="{4B7FD7B1-80C6-4D61-9C5D-E8E4B5CDF140}" destId="{7C3DC7B1-1D6E-4455-B112-FFB8EC0A4734}" srcOrd="0" destOrd="0" presId="urn:microsoft.com/office/officeart/2005/8/layout/hProcess9"/>
-    <dgm:cxn modelId="{1965AC51-E6BB-4350-A645-47C0813ACC25}" srcId="{2548F702-1E66-46B5-9ABC-6AB759D5FB8B}" destId="{6828C8CB-43B5-4266-8540-50DF4A7CE478}" srcOrd="2" destOrd="0" parTransId="{DBB32007-D7D1-4235-AF2F-26753076DD1F}" sibTransId="{34032CCF-9005-477B-8CE1-C04720CC1B51}"/>
     <dgm:cxn modelId="{886EB838-9B85-4DD8-ABDA-19C955E82BF7}" type="presOf" srcId="{A06C0772-EB4B-4520-A051-FD8F1570906C}" destId="{2FBF7677-57AD-488C-B2D1-8BF43E2ABE7C}" srcOrd="0" destOrd="0" presId="urn:microsoft.com/office/officeart/2005/8/layout/hProcess9"/>
-    <dgm:cxn modelId="{4294350E-6B4A-4D68-8807-55E8C2E297E3}" srcId="{89CCD24F-B0E7-4BE6-AFBB-69918AC636CA}" destId="{C023FF99-D9FD-4B49-A88B-01BCF7A49C9F}" srcOrd="2" destOrd="0" parTransId="{39DE6B66-13AA-4E17-9976-D8C78F8396B7}" sibTransId="{C3D96D10-02BE-48F8-B32F-88F9D24CF0B8}"/>
-    <dgm:cxn modelId="{A1C64B13-490C-4DF4-9EAA-353B45AA3C16}" srcId="{89CCD24F-B0E7-4BE6-AFBB-69918AC636CA}" destId="{592F4F55-0D78-4348-AC3F-35448EFB8008}" srcOrd="1" destOrd="0" parTransId="{D8FDD8CE-1BDC-468E-9273-777562710EDB}" sibTransId="{AF5F3E5E-B8A8-4390-B181-739919934DD6}"/>
-    <dgm:cxn modelId="{D68AF3BF-0603-4B94-BA92-C66CC01B6184}" srcId="{07BA4662-2877-4706-8B15-70BECE5A088D}" destId="{01324C8E-7505-48B5-82E1-C7B2B6946093}" srcOrd="1" destOrd="0" parTransId="{478BAD4B-83B8-4C23-81C3-A615F6674249}" sibTransId="{9DC9D054-72B7-4EA6-BD6E-5F0F92555D6E}"/>
-    <dgm:cxn modelId="{AA6638A7-2004-4AD4-8FCF-303787E979B5}" srcId="{89CCD24F-B0E7-4BE6-AFBB-69918AC636CA}" destId="{A62816C7-87E1-4B6D-8170-A03B59E00E7D}" srcOrd="0" destOrd="0" parTransId="{6C5CBBFA-7FB0-4D88-B698-6E6596C20F27}" sibTransId="{CBBF12B0-646B-4D61-AC2D-24642774C2D7}"/>
-    <dgm:cxn modelId="{3DE3E2D7-55E3-468F-B59D-8A6271228D79}" type="presOf" srcId="{89CCD24F-B0E7-4BE6-AFBB-69918AC636CA}" destId="{2F4EC6A7-3F18-4C8F-B73E-406B343EEC5D}" srcOrd="0" destOrd="0" presId="urn:microsoft.com/office/officeart/2005/8/layout/hProcess9"/>
-    <dgm:cxn modelId="{B0E8F0E5-7FAA-4B6D-B99F-8C5E3029DCF7}" type="presOf" srcId="{9831EE05-56A0-4624-BE28-3391F3ED382C}" destId="{2F4EC6A7-3F18-4C8F-B73E-406B343EEC5D}" srcOrd="0" destOrd="4" presId="urn:microsoft.com/office/officeart/2005/8/layout/hProcess9"/>
-    <dgm:cxn modelId="{35FF2E88-9048-4AB1-8B2F-331440A25FF4}" srcId="{0CE19505-E527-44F5-9B78-63CAD7F2C92C}" destId="{07BA4662-2877-4706-8B15-70BECE5A088D}" srcOrd="3" destOrd="0" parTransId="{2EFB02A5-04F0-4F69-A652-3F40D7C409C3}" sibTransId="{0BB11E57-7AD1-4AA8-8531-E5A587F3DD83}"/>
-    <dgm:cxn modelId="{758D754C-6D32-419D-BD92-5DF33D0EFE21}" srcId="{07BA4662-2877-4706-8B15-70BECE5A088D}" destId="{D2B32A0E-0716-4FAE-9A5D-E301162960D9}" srcOrd="0" destOrd="0" parTransId="{D960F4E1-6BC3-44C2-84CD-A63F526C1377}" sibTransId="{1412E769-4308-4D52-8641-37C954431D4A}"/>
-    <dgm:cxn modelId="{D713D93E-ADD7-4532-8677-9A5A4E94425D}" srcId="{3B52B5AC-6D41-4359-8DD1-2BE71A3CCB59}" destId="{CFFE6439-16EE-455B-97C7-BA683E5C6C92}" srcOrd="1" destOrd="0" parTransId="{4B293F50-D806-4AE9-8470-EEFD89ACDE79}" sibTransId="{F01C7ABC-4524-40C8-8511-821C918D2200}"/>
-    <dgm:cxn modelId="{8733AFC6-CECC-409F-89C2-02B7B9C74E3A}" type="presOf" srcId="{D2B32A0E-0716-4FAE-9A5D-E301162960D9}" destId="{662950D7-268F-48DD-A417-A8B5FEAB54E6}" srcOrd="0" destOrd="1" presId="urn:microsoft.com/office/officeart/2005/8/layout/hProcess9"/>
-    <dgm:cxn modelId="{DF816D2D-EF45-4472-9BBA-80701F27BD02}" type="presOf" srcId="{01324C8E-7505-48B5-82E1-C7B2B6946093}" destId="{662950D7-268F-48DD-A417-A8B5FEAB54E6}" srcOrd="0" destOrd="2" presId="urn:microsoft.com/office/officeart/2005/8/layout/hProcess9"/>
-    <dgm:cxn modelId="{CD443531-386C-4938-BA42-67C07E45F50F}" type="presOf" srcId="{76A909F4-06BA-4113-B4E7-7E1E8E3A43D2}" destId="{8507952A-1E94-467D-B948-0A321F24253C}" srcOrd="0" destOrd="3" presId="urn:microsoft.com/office/officeart/2005/8/layout/hProcess9"/>
-    <dgm:cxn modelId="{919B43A5-D0F6-45BA-AC1B-7BDC103DFFCF}" type="presOf" srcId="{3B52B5AC-6D41-4359-8DD1-2BE71A3CCB59}" destId="{8507952A-1E94-467D-B948-0A321F24253C}" srcOrd="0" destOrd="0" presId="urn:microsoft.com/office/officeart/2005/8/layout/hProcess9"/>
-    <dgm:cxn modelId="{DE47F4F0-03BB-4A06-963C-30EBE4D4992A}" srcId="{3B52B5AC-6D41-4359-8DD1-2BE71A3CCB59}" destId="{76A909F4-06BA-4113-B4E7-7E1E8E3A43D2}" srcOrd="2" destOrd="0" parTransId="{421A1E6A-9E59-4069-B3A8-1F72A9A1FB6E}" sibTransId="{0EF0407B-D115-469E-BA40-1334B8D820F5}"/>
-    <dgm:cxn modelId="{D0609B39-AD03-43EE-A1E7-05636C927216}" type="presOf" srcId="{592F4F55-0D78-4348-AC3F-35448EFB8008}" destId="{2F4EC6A7-3F18-4C8F-B73E-406B343EEC5D}" srcOrd="0" destOrd="2" presId="urn:microsoft.com/office/officeart/2005/8/layout/hProcess9"/>
-    <dgm:cxn modelId="{4666DE3B-CB84-4FEB-B337-04493CC25E88}" srcId="{2548F702-1E66-46B5-9ABC-6AB759D5FB8B}" destId="{19FB6450-4E26-4AFE-B85A-027ADE879B2C}" srcOrd="1" destOrd="0" parTransId="{85899F9B-50D3-47C5-9E18-3A323967E3EF}" sibTransId="{CCC48E57-F303-4574-8BDE-7B1A1D9C4F2E}"/>
-    <dgm:cxn modelId="{1009F17F-90B8-4FC8-B36B-B7411DE10B2F}" srcId="{3B52B5AC-6D41-4359-8DD1-2BE71A3CCB59}" destId="{96566F36-C677-494B-802B-E321CCEFDD3F}" srcOrd="0" destOrd="0" parTransId="{9C5D248A-3ED6-4816-B0E0-B73F510FB1F4}" sibTransId="{ACE7F517-28CF-49FB-8716-79F32F3603E7}"/>
-    <dgm:cxn modelId="{848CB416-1BC8-431C-A0B0-1A297CAA0C8A}" type="presOf" srcId="{96566F36-C677-494B-802B-E321CCEFDD3F}" destId="{8507952A-1E94-467D-B948-0A321F24253C}" srcOrd="0" destOrd="1" presId="urn:microsoft.com/office/officeart/2005/8/layout/hProcess9"/>
-    <dgm:cxn modelId="{26F3CB22-97E1-4114-A0F7-91F663100A11}" type="presOf" srcId="{B2B5CACB-4AB1-4E87-80E7-580337C28B1F}" destId="{C9581C09-77CE-4113-A727-C2C15E28AEB3}" srcOrd="0" destOrd="1" presId="urn:microsoft.com/office/officeart/2005/8/layout/hProcess9"/>
-    <dgm:cxn modelId="{CE67A9F7-F573-41A1-8034-DEEBC0E42104}" type="presOf" srcId="{6828C8CB-43B5-4266-8540-50DF4A7CE478}" destId="{C9581C09-77CE-4113-A727-C2C15E28AEB3}" srcOrd="0" destOrd="3" presId="urn:microsoft.com/office/officeart/2005/8/layout/hProcess9"/>
-    <dgm:cxn modelId="{B5118A0E-CEAA-4885-947F-AAF8250F203F}" srcId="{0CE19505-E527-44F5-9B78-63CAD7F2C92C}" destId="{A06C0772-EB4B-4520-A051-FD8F1570906C}" srcOrd="0" destOrd="0" parTransId="{EA34971E-4A19-4FF4-9294-F0C5049BB0EE}" sibTransId="{EB52F477-5A61-4620-994B-A9560FFD8D2B}"/>
-    <dgm:cxn modelId="{14FF0A94-2EEB-47AC-BC81-375AD19881ED}" srcId="{0CE19505-E527-44F5-9B78-63CAD7F2C92C}" destId="{3B52B5AC-6D41-4359-8DD1-2BE71A3CCB59}" srcOrd="4" destOrd="0" parTransId="{1A1EE3AA-B3D0-498C-B40A-199637014D7D}" sibTransId="{428AC4C3-FB35-4270-AFEA-E8B9B623BCA3}"/>
     <dgm:cxn modelId="{2C738D18-174D-434C-A185-0A0792AFF3DE}" type="presParOf" srcId="{95E47628-2374-4318-ABF1-BD44693D8A7E}" destId="{AF494991-0145-42FB-9FAC-84598739C7BF}" srcOrd="0" destOrd="0" presId="urn:microsoft.com/office/officeart/2005/8/layout/hProcess9"/>
     <dgm:cxn modelId="{09836A4E-8A64-4218-B825-6B0D86B06AEB}" type="presParOf" srcId="{95E47628-2374-4318-ABF1-BD44693D8A7E}" destId="{ADF6AB2A-95DC-4439-9B7B-534BA7C13FAE}" srcOrd="1" destOrd="0" presId="urn:microsoft.com/office/officeart/2005/8/layout/hProcess9"/>
     <dgm:cxn modelId="{E8050DD8-D335-42AD-B3FD-C0DD6BB8DFA3}" type="presParOf" srcId="{ADF6AB2A-95DC-4439-9B7B-534BA7C13FAE}" destId="{2FBF7677-57AD-488C-B2D1-8BF43E2ABE7C}" srcOrd="0" destOrd="0" presId="urn:microsoft.com/office/officeart/2005/8/layout/hProcess9"/>
@@ -6729,23 +6730,555 @@
       <dsp:cNvGrpSpPr/>
     </dsp:nvGrpSpPr>
     <dsp:grpSpPr/>
+    <dsp:sp modelId="{AF494991-0145-42FB-9FAC-84598739C7BF}">
+      <dsp:nvSpPr>
+        <dsp:cNvPr id="0" name=""/>
+        <dsp:cNvSpPr/>
+      </dsp:nvSpPr>
+      <dsp:spPr>
+        <a:xfrm>
+          <a:off x="634364" y="0"/>
+          <a:ext cx="7189470" cy="5257798"/>
+        </a:xfrm>
+        <a:prstGeom prst="rightArrow">
+          <a:avLst/>
+        </a:prstGeom>
+        <a:solidFill>
+          <a:srgbClr val="C00000">
+            <a:alpha val="67059"/>
+          </a:srgbClr>
+        </a:solidFill>
+        <a:ln>
+          <a:noFill/>
+        </a:ln>
+        <a:effectLst/>
+      </dsp:spPr>
+      <dsp:style>
+        <a:lnRef idx="0">
+          <a:scrgbClr r="0" g="0" b="0"/>
+        </a:lnRef>
+        <a:fillRef idx="1">
+          <a:scrgbClr r="0" g="0" b="0"/>
+        </a:fillRef>
+        <a:effectRef idx="0">
+          <a:scrgbClr r="0" g="0" b="0"/>
+        </a:effectRef>
+        <a:fontRef idx="minor"/>
+      </dsp:style>
+    </dsp:sp>
+    <dsp:sp modelId="{2FBF7677-57AD-488C-B2D1-8BF43E2ABE7C}">
+      <dsp:nvSpPr>
+        <dsp:cNvPr id="0" name=""/>
+        <dsp:cNvSpPr/>
+      </dsp:nvSpPr>
+      <dsp:spPr>
+        <a:xfrm>
+          <a:off x="722" y="1577339"/>
+          <a:ext cx="1158459" cy="2103119"/>
+        </a:xfrm>
+        <a:prstGeom prst="roundRect">
+          <a:avLst/>
+        </a:prstGeom>
+        <a:solidFill>
+          <a:srgbClr val="C00000"/>
+        </a:solidFill>
+        <a:ln w="25400" cap="flat" cmpd="sng" algn="ctr">
+          <a:solidFill>
+            <a:schemeClr val="lt1">
+              <a:hueOff val="0"/>
+              <a:satOff val="0"/>
+              <a:lumOff val="0"/>
+              <a:alphaOff val="0"/>
+            </a:schemeClr>
+          </a:solidFill>
+          <a:prstDash val="solid"/>
+        </a:ln>
+        <a:effectLst/>
+      </dsp:spPr>
+      <dsp:style>
+        <a:lnRef idx="2">
+          <a:scrgbClr r="0" g="0" b="0"/>
+        </a:lnRef>
+        <a:fillRef idx="1">
+          <a:scrgbClr r="0" g="0" b="0"/>
+        </a:fillRef>
+        <a:effectRef idx="0">
+          <a:scrgbClr r="0" g="0" b="0"/>
+        </a:effectRef>
+        <a:fontRef idx="minor">
+          <a:schemeClr val="lt1"/>
+        </a:fontRef>
+      </dsp:style>
+      <dsp:txBody>
+        <a:bodyPr spcFirstLastPara="0" vert="horz" wrap="square" lIns="49530" tIns="49530" rIns="49530" bIns="49530" numCol="1" spcCol="1270" anchor="ctr" anchorCtr="0">
+          <a:noAutofit/>
+        </a:bodyPr>
+        <a:lstStyle/>
+        <a:p>
+          <a:pPr lvl="0" algn="ctr" defTabSz="577850">
+            <a:lnSpc>
+              <a:spcPct val="90000"/>
+            </a:lnSpc>
+            <a:spcBef>
+              <a:spcPct val="0"/>
+            </a:spcBef>
+            <a:spcAft>
+              <a:spcPct val="35000"/>
+            </a:spcAft>
+          </a:pPr>
+          <a:r>
+            <a:rPr lang="en-US" sz="1300" kern="1200" dirty="0" smtClean="0"/>
+            <a:t>Development Sandbox</a:t>
+          </a:r>
+          <a:endParaRPr lang="en-US" sz="1300" kern="1200" dirty="0"/>
+        </a:p>
+      </dsp:txBody>
+      <dsp:txXfrm>
+        <a:off x="57273" y="1633890"/>
+        <a:ext cx="1045357" cy="1990017"/>
+      </dsp:txXfrm>
+    </dsp:sp>
+    <dsp:sp modelId="{72B9532E-95F7-4D64-9D7D-5DA593B79D93}">
+      <dsp:nvSpPr>
+        <dsp:cNvPr id="0" name=""/>
+        <dsp:cNvSpPr/>
+      </dsp:nvSpPr>
+      <dsp:spPr>
+        <a:xfrm>
+          <a:off x="1217105" y="1577339"/>
+          <a:ext cx="1158459" cy="2103119"/>
+        </a:xfrm>
+        <a:prstGeom prst="roundRect">
+          <a:avLst/>
+        </a:prstGeom>
+        <a:solidFill>
+          <a:srgbClr val="C00000"/>
+        </a:solidFill>
+        <a:ln w="25400" cap="flat" cmpd="sng" algn="ctr">
+          <a:solidFill>
+            <a:schemeClr val="lt1">
+              <a:hueOff val="0"/>
+              <a:satOff val="0"/>
+              <a:lumOff val="0"/>
+              <a:alphaOff val="0"/>
+            </a:schemeClr>
+          </a:solidFill>
+          <a:prstDash val="solid"/>
+        </a:ln>
+        <a:effectLst/>
+      </dsp:spPr>
+      <dsp:style>
+        <a:lnRef idx="2">
+          <a:scrgbClr r="0" g="0" b="0"/>
+        </a:lnRef>
+        <a:fillRef idx="1">
+          <a:scrgbClr r="0" g="0" b="0"/>
+        </a:fillRef>
+        <a:effectRef idx="0">
+          <a:scrgbClr r="0" g="0" b="0"/>
+        </a:effectRef>
+        <a:fontRef idx="minor">
+          <a:schemeClr val="lt1"/>
+        </a:fontRef>
+      </dsp:style>
+      <dsp:txBody>
+        <a:bodyPr spcFirstLastPara="0" vert="horz" wrap="square" lIns="49530" tIns="49530" rIns="49530" bIns="49530" numCol="1" spcCol="1270" anchor="ctr" anchorCtr="0">
+          <a:noAutofit/>
+        </a:bodyPr>
+        <a:lstStyle/>
+        <a:p>
+          <a:pPr lvl="0" algn="ctr" defTabSz="577850">
+            <a:lnSpc>
+              <a:spcPct val="90000"/>
+            </a:lnSpc>
+            <a:spcBef>
+              <a:spcPct val="0"/>
+            </a:spcBef>
+            <a:spcAft>
+              <a:spcPct val="35000"/>
+            </a:spcAft>
+          </a:pPr>
+          <a:r>
+            <a:rPr lang="en-US" sz="1300" kern="1200" dirty="0" smtClean="0"/>
+            <a:t>VCS</a:t>
+          </a:r>
+          <a:endParaRPr lang="en-US" sz="1300" kern="1200" dirty="0"/>
+        </a:p>
+      </dsp:txBody>
+      <dsp:txXfrm>
+        <a:off x="1273656" y="1633890"/>
+        <a:ext cx="1045357" cy="1990017"/>
+      </dsp:txXfrm>
+    </dsp:sp>
+    <dsp:sp modelId="{2F4EC6A7-3F18-4C8F-B73E-406B343EEC5D}">
+      <dsp:nvSpPr>
+        <dsp:cNvPr id="0" name=""/>
+        <dsp:cNvSpPr/>
+      </dsp:nvSpPr>
+      <dsp:spPr>
+        <a:xfrm>
+          <a:off x="2433487" y="1577339"/>
+          <a:ext cx="1158459" cy="2103119"/>
+        </a:xfrm>
+        <a:prstGeom prst="roundRect">
+          <a:avLst/>
+        </a:prstGeom>
+        <a:solidFill>
+          <a:srgbClr val="C00000"/>
+        </a:solidFill>
+        <a:ln w="25400" cap="flat" cmpd="sng" algn="ctr">
+          <a:solidFill>
+            <a:schemeClr val="lt1">
+              <a:hueOff val="0"/>
+              <a:satOff val="0"/>
+              <a:lumOff val="0"/>
+              <a:alphaOff val="0"/>
+            </a:schemeClr>
+          </a:solidFill>
+          <a:prstDash val="solid"/>
+        </a:ln>
+        <a:effectLst/>
+      </dsp:spPr>
+      <dsp:style>
+        <a:lnRef idx="2">
+          <a:scrgbClr r="0" g="0" b="0"/>
+        </a:lnRef>
+        <a:fillRef idx="1">
+          <a:scrgbClr r="0" g="0" b="0"/>
+        </a:fillRef>
+        <a:effectRef idx="0">
+          <a:scrgbClr r="0" g="0" b="0"/>
+        </a:effectRef>
+        <a:fontRef idx="minor">
+          <a:schemeClr val="lt1"/>
+        </a:fontRef>
+      </dsp:style>
+      <dsp:txBody>
+        <a:bodyPr spcFirstLastPara="0" vert="horz" wrap="square" lIns="49530" tIns="49530" rIns="49530" bIns="49530" numCol="1" spcCol="1270" anchor="ctr" anchorCtr="0">
+          <a:noAutofit/>
+        </a:bodyPr>
+        <a:lstStyle/>
+        <a:p>
+          <a:pPr lvl="0" algn="ctr" defTabSz="577850">
+            <a:lnSpc>
+              <a:spcPct val="90000"/>
+            </a:lnSpc>
+            <a:spcBef>
+              <a:spcPct val="0"/>
+            </a:spcBef>
+            <a:spcAft>
+              <a:spcPct val="35000"/>
+            </a:spcAft>
+          </a:pPr>
+          <a:r>
+            <a:rPr lang="en-US" sz="1300" kern="1200" smtClean="0"/>
+            <a:t>Continuous </a:t>
+          </a:r>
+          <a:r>
+            <a:rPr lang="en-US" sz="1300" kern="1200" dirty="0" smtClean="0"/>
+            <a:t>Integration</a:t>
+          </a:r>
+          <a:endParaRPr lang="en-US" sz="1300" kern="1200" dirty="0"/>
+        </a:p>
+      </dsp:txBody>
+      <dsp:txXfrm>
+        <a:off x="2490038" y="1633890"/>
+        <a:ext cx="1045357" cy="1990017"/>
+      </dsp:txXfrm>
+    </dsp:sp>
+    <dsp:sp modelId="{662950D7-268F-48DD-A417-A8B5FEAB54E6}">
+      <dsp:nvSpPr>
+        <dsp:cNvPr id="0" name=""/>
+        <dsp:cNvSpPr/>
+      </dsp:nvSpPr>
+      <dsp:spPr>
+        <a:xfrm>
+          <a:off x="3649870" y="1577339"/>
+          <a:ext cx="1158459" cy="2103119"/>
+        </a:xfrm>
+        <a:prstGeom prst="roundRect">
+          <a:avLst/>
+        </a:prstGeom>
+        <a:solidFill>
+          <a:srgbClr val="C00000"/>
+        </a:solidFill>
+        <a:ln w="25400" cap="flat" cmpd="sng" algn="ctr">
+          <a:solidFill>
+            <a:schemeClr val="lt1">
+              <a:hueOff val="0"/>
+              <a:satOff val="0"/>
+              <a:lumOff val="0"/>
+              <a:alphaOff val="0"/>
+            </a:schemeClr>
+          </a:solidFill>
+          <a:prstDash val="solid"/>
+        </a:ln>
+        <a:effectLst/>
+      </dsp:spPr>
+      <dsp:style>
+        <a:lnRef idx="2">
+          <a:scrgbClr r="0" g="0" b="0"/>
+        </a:lnRef>
+        <a:fillRef idx="1">
+          <a:scrgbClr r="0" g="0" b="0"/>
+        </a:fillRef>
+        <a:effectRef idx="0">
+          <a:scrgbClr r="0" g="0" b="0"/>
+        </a:effectRef>
+        <a:fontRef idx="minor">
+          <a:schemeClr val="lt1"/>
+        </a:fontRef>
+      </dsp:style>
+      <dsp:txBody>
+        <a:bodyPr spcFirstLastPara="0" vert="horz" wrap="square" lIns="49530" tIns="49530" rIns="49530" bIns="49530" numCol="1" spcCol="1270" anchor="ctr" anchorCtr="0">
+          <a:noAutofit/>
+        </a:bodyPr>
+        <a:lstStyle/>
+        <a:p>
+          <a:pPr lvl="0" algn="ctr" defTabSz="577850">
+            <a:lnSpc>
+              <a:spcPct val="90000"/>
+            </a:lnSpc>
+            <a:spcBef>
+              <a:spcPct val="0"/>
+            </a:spcBef>
+            <a:spcAft>
+              <a:spcPct val="35000"/>
+            </a:spcAft>
+          </a:pPr>
+          <a:r>
+            <a:rPr lang="en-US" sz="1300" kern="1200" dirty="0" smtClean="0"/>
+            <a:t>Development Integration </a:t>
+          </a:r>
+          <a:endParaRPr lang="en-US" sz="1300" kern="1200" dirty="0"/>
+        </a:p>
+      </dsp:txBody>
+      <dsp:txXfrm>
+        <a:off x="3706421" y="1633890"/>
+        <a:ext cx="1045357" cy="1990017"/>
+      </dsp:txXfrm>
+    </dsp:sp>
+    <dsp:sp modelId="{8507952A-1E94-467D-B948-0A321F24253C}">
+      <dsp:nvSpPr>
+        <dsp:cNvPr id="0" name=""/>
+        <dsp:cNvSpPr/>
+      </dsp:nvSpPr>
+      <dsp:spPr>
+        <a:xfrm>
+          <a:off x="4866252" y="1577339"/>
+          <a:ext cx="1158459" cy="2103119"/>
+        </a:xfrm>
+        <a:prstGeom prst="roundRect">
+          <a:avLst/>
+        </a:prstGeom>
+        <a:solidFill>
+          <a:srgbClr val="C00000"/>
+        </a:solidFill>
+        <a:ln w="25400" cap="flat" cmpd="sng" algn="ctr">
+          <a:solidFill>
+            <a:schemeClr val="lt1">
+              <a:hueOff val="0"/>
+              <a:satOff val="0"/>
+              <a:lumOff val="0"/>
+              <a:alphaOff val="0"/>
+            </a:schemeClr>
+          </a:solidFill>
+          <a:prstDash val="solid"/>
+        </a:ln>
+        <a:effectLst/>
+      </dsp:spPr>
+      <dsp:style>
+        <a:lnRef idx="2">
+          <a:scrgbClr r="0" g="0" b="0"/>
+        </a:lnRef>
+        <a:fillRef idx="1">
+          <a:scrgbClr r="0" g="0" b="0"/>
+        </a:fillRef>
+        <a:effectRef idx="0">
+          <a:scrgbClr r="0" g="0" b="0"/>
+        </a:effectRef>
+        <a:fontRef idx="minor">
+          <a:schemeClr val="lt1"/>
+        </a:fontRef>
+      </dsp:style>
+      <dsp:txBody>
+        <a:bodyPr spcFirstLastPara="0" vert="horz" wrap="square" lIns="49530" tIns="49530" rIns="49530" bIns="49530" numCol="1" spcCol="1270" anchor="ctr" anchorCtr="0">
+          <a:noAutofit/>
+        </a:bodyPr>
+        <a:lstStyle/>
+        <a:p>
+          <a:pPr lvl="0" algn="ctr" defTabSz="577850">
+            <a:lnSpc>
+              <a:spcPct val="90000"/>
+            </a:lnSpc>
+            <a:spcBef>
+              <a:spcPct val="0"/>
+            </a:spcBef>
+            <a:spcAft>
+              <a:spcPct val="35000"/>
+            </a:spcAft>
+          </a:pPr>
+          <a:r>
+            <a:rPr lang="en-US" sz="1300" kern="1200" dirty="0" smtClean="0"/>
+            <a:t>QA</a:t>
+          </a:r>
+          <a:endParaRPr lang="en-US" sz="1300" kern="1200" dirty="0"/>
+        </a:p>
+      </dsp:txBody>
+      <dsp:txXfrm>
+        <a:off x="4922803" y="1633890"/>
+        <a:ext cx="1045357" cy="1990017"/>
+      </dsp:txXfrm>
+    </dsp:sp>
+    <dsp:sp modelId="{7C3DC7B1-1D6E-4455-B112-FFB8EC0A4734}">
+      <dsp:nvSpPr>
+        <dsp:cNvPr id="0" name=""/>
+        <dsp:cNvSpPr/>
+      </dsp:nvSpPr>
+      <dsp:spPr>
+        <a:xfrm>
+          <a:off x="6082635" y="1577339"/>
+          <a:ext cx="1158459" cy="2103119"/>
+        </a:xfrm>
+        <a:prstGeom prst="roundRect">
+          <a:avLst/>
+        </a:prstGeom>
+        <a:solidFill>
+          <a:srgbClr val="C00000"/>
+        </a:solidFill>
+        <a:ln w="25400" cap="flat" cmpd="sng" algn="ctr">
+          <a:solidFill>
+            <a:schemeClr val="lt1">
+              <a:hueOff val="0"/>
+              <a:satOff val="0"/>
+              <a:lumOff val="0"/>
+              <a:alphaOff val="0"/>
+            </a:schemeClr>
+          </a:solidFill>
+          <a:prstDash val="solid"/>
+        </a:ln>
+        <a:effectLst/>
+      </dsp:spPr>
+      <dsp:style>
+        <a:lnRef idx="2">
+          <a:scrgbClr r="0" g="0" b="0"/>
+        </a:lnRef>
+        <a:fillRef idx="1">
+          <a:scrgbClr r="0" g="0" b="0"/>
+        </a:fillRef>
+        <a:effectRef idx="0">
+          <a:scrgbClr r="0" g="0" b="0"/>
+        </a:effectRef>
+        <a:fontRef idx="minor">
+          <a:schemeClr val="lt1"/>
+        </a:fontRef>
+      </dsp:style>
+      <dsp:txBody>
+        <a:bodyPr spcFirstLastPara="0" vert="horz" wrap="square" lIns="49530" tIns="49530" rIns="49530" bIns="49530" numCol="1" spcCol="1270" anchor="ctr" anchorCtr="0">
+          <a:noAutofit/>
+        </a:bodyPr>
+        <a:lstStyle/>
+        <a:p>
+          <a:pPr lvl="0" algn="ctr" defTabSz="577850">
+            <a:lnSpc>
+              <a:spcPct val="90000"/>
+            </a:lnSpc>
+            <a:spcBef>
+              <a:spcPct val="0"/>
+            </a:spcBef>
+            <a:spcAft>
+              <a:spcPct val="35000"/>
+            </a:spcAft>
+          </a:pPr>
+          <a:r>
+            <a:rPr lang="en-US" sz="1300" kern="1200" dirty="0" smtClean="0"/>
+            <a:t>UAT/ 1..n other environments</a:t>
+          </a:r>
+          <a:endParaRPr lang="en-US" sz="1300" kern="1200" dirty="0"/>
+        </a:p>
+      </dsp:txBody>
+      <dsp:txXfrm>
+        <a:off x="6139186" y="1633890"/>
+        <a:ext cx="1045357" cy="1990017"/>
+      </dsp:txXfrm>
+    </dsp:sp>
+    <dsp:sp modelId="{C9581C09-77CE-4113-A727-C2C15E28AEB3}">
+      <dsp:nvSpPr>
+        <dsp:cNvPr id="0" name=""/>
+        <dsp:cNvSpPr/>
+      </dsp:nvSpPr>
+      <dsp:spPr>
+        <a:xfrm>
+          <a:off x="7299017" y="1577339"/>
+          <a:ext cx="1158459" cy="2103119"/>
+        </a:xfrm>
+        <a:prstGeom prst="roundRect">
+          <a:avLst/>
+        </a:prstGeom>
+        <a:solidFill>
+          <a:srgbClr val="C00000"/>
+        </a:solidFill>
+        <a:ln w="25400" cap="flat" cmpd="sng" algn="ctr">
+          <a:solidFill>
+            <a:schemeClr val="lt1">
+              <a:hueOff val="0"/>
+              <a:satOff val="0"/>
+              <a:lumOff val="0"/>
+              <a:alphaOff val="0"/>
+            </a:schemeClr>
+          </a:solidFill>
+          <a:prstDash val="solid"/>
+        </a:ln>
+        <a:effectLst/>
+      </dsp:spPr>
+      <dsp:style>
+        <a:lnRef idx="2">
+          <a:scrgbClr r="0" g="0" b="0"/>
+        </a:lnRef>
+        <a:fillRef idx="1">
+          <a:scrgbClr r="0" g="0" b="0"/>
+        </a:fillRef>
+        <a:effectRef idx="0">
+          <a:scrgbClr r="0" g="0" b="0"/>
+        </a:effectRef>
+        <a:fontRef idx="minor">
+          <a:schemeClr val="lt1"/>
+        </a:fontRef>
+      </dsp:style>
+      <dsp:txBody>
+        <a:bodyPr spcFirstLastPara="0" vert="horz" wrap="square" lIns="49530" tIns="49530" rIns="49530" bIns="49530" numCol="1" spcCol="1270" anchor="ctr" anchorCtr="0">
+          <a:noAutofit/>
+        </a:bodyPr>
+        <a:lstStyle/>
+        <a:p>
+          <a:pPr lvl="0" algn="ctr" defTabSz="577850">
+            <a:lnSpc>
+              <a:spcPct val="90000"/>
+            </a:lnSpc>
+            <a:spcBef>
+              <a:spcPct val="0"/>
+            </a:spcBef>
+            <a:spcAft>
+              <a:spcPct val="35000"/>
+            </a:spcAft>
+          </a:pPr>
+          <a:r>
+            <a:rPr lang="en-US" sz="1300" kern="1200" smtClean="0"/>
+            <a:t>Production</a:t>
+          </a:r>
+          <a:endParaRPr lang="en-US" sz="1300" kern="1200" dirty="0"/>
+        </a:p>
+      </dsp:txBody>
+      <dsp:txXfrm>
+        <a:off x="7355568" y="1633890"/>
+        <a:ext cx="1045357" cy="1990017"/>
+      </dsp:txXfrm>
+    </dsp:sp>
   </dsp:spTree>
 </dsp:drawing>
 </file>
 
 <file path=ppt/diagrams/drawing2.xml><?xml version="1.0" encoding="utf-8"?>
-<dsp:drawing xmlns:dgm="http://schemas.openxmlformats.org/drawingml/2006/diagram" xmlns:dsp="http://schemas.microsoft.com/office/drawing/2008/diagram" xmlns:a="http://schemas.openxmlformats.org/drawingml/2006/main">
-  <dsp:spTree>
-    <dsp:nvGrpSpPr>
-      <dsp:cNvPr id="0" name=""/>
-      <dsp:cNvGrpSpPr/>
-    </dsp:nvGrpSpPr>
-    <dsp:grpSpPr/>
-  </dsp:spTree>
-</dsp:drawing>
-</file>
-
-<file path=ppt/diagrams/drawing3.xml><?xml version="1.0" encoding="utf-8"?>
 <dsp:drawing xmlns:dgm="http://schemas.openxmlformats.org/drawingml/2006/diagram" xmlns:dsp="http://schemas.microsoft.com/office/drawing/2008/diagram" xmlns:a="http://schemas.openxmlformats.org/drawingml/2006/main">
   <dsp:spTree>
     <dsp:nvGrpSpPr>
@@ -7336,6 +7869,18 @@
         <a:ext cx="1045357" cy="1990017"/>
       </dsp:txXfrm>
     </dsp:sp>
+  </dsp:spTree>
+</dsp:drawing>
+</file>
+
+<file path=ppt/diagrams/drawing3.xml><?xml version="1.0" encoding="utf-8"?>
+<dsp:drawing xmlns:dgm="http://schemas.openxmlformats.org/drawingml/2006/diagram" xmlns:dsp="http://schemas.microsoft.com/office/drawing/2008/diagram" xmlns:a="http://schemas.openxmlformats.org/drawingml/2006/main">
+  <dsp:spTree>
+    <dsp:nvGrpSpPr>
+      <dsp:cNvPr id="0" name=""/>
+      <dsp:cNvGrpSpPr/>
+    </dsp:nvGrpSpPr>
+    <dsp:grpSpPr/>
   </dsp:spTree>
 </dsp:drawing>
 </file>
@@ -13386,7 +13931,7 @@
           <a:p>
             <a:fld id="{3C31BDEC-C855-4A20-BFC3-C78B82093698}" type="datetimeFigureOut">
               <a:rPr lang="en-US" smtClean="0"/>
-              <a:t>5/9/2014</a:t>
+              <a:t>5/19/2014</a:t>
             </a:fld>
             <a:endParaRPr lang="en-US"/>
           </a:p>
@@ -13853,7 +14398,7 @@
           <a:p>
             <a:fld id="{737EB954-88EE-45B2-878D-41C5C083E9B9}" type="slidenum">
               <a:rPr lang="en-US" smtClean="0"/>
-              <a:t>15</a:t>
+              <a:t>16</a:t>
             </a:fld>
             <a:endParaRPr lang="en-US"/>
           </a:p>
@@ -14191,7 +14736,7 @@
           <a:p>
             <a:fld id="{737EB954-88EE-45B2-878D-41C5C083E9B9}" type="slidenum">
               <a:rPr lang="en-US" smtClean="0"/>
-              <a:t>16</a:t>
+              <a:t>17</a:t>
             </a:fld>
             <a:endParaRPr lang="en-US"/>
           </a:p>
@@ -14309,7 +14854,7 @@
           <a:p>
             <a:fld id="{737EB954-88EE-45B2-878D-41C5C083E9B9}" type="slidenum">
               <a:rPr lang="en-US" smtClean="0"/>
-              <a:t>18</a:t>
+              <a:t>19</a:t>
             </a:fld>
             <a:endParaRPr lang="en-US"/>
           </a:p>
@@ -14427,7 +14972,7 @@
           <a:p>
             <a:fld id="{737EB954-88EE-45B2-878D-41C5C083E9B9}" type="slidenum">
               <a:rPr lang="en-US" smtClean="0"/>
-              <a:t>21</a:t>
+              <a:t>22</a:t>
             </a:fld>
             <a:endParaRPr lang="en-US"/>
           </a:p>
@@ -14524,7 +15069,7 @@
           <a:p>
             <a:fld id="{737EB954-88EE-45B2-878D-41C5C083E9B9}" type="slidenum">
               <a:rPr lang="en-US" smtClean="0"/>
-              <a:t>25</a:t>
+              <a:t>26</a:t>
             </a:fld>
             <a:endParaRPr lang="en-US"/>
           </a:p>
@@ -14649,7 +15194,7 @@
           <a:p>
             <a:fld id="{737EB954-88EE-45B2-878D-41C5C083E9B9}" type="slidenum">
               <a:rPr lang="en-US" smtClean="0"/>
-              <a:t>29</a:t>
+              <a:t>30</a:t>
             </a:fld>
             <a:endParaRPr lang="en-US"/>
           </a:p>
@@ -14746,7 +15291,7 @@
           <a:p>
             <a:fld id="{737EB954-88EE-45B2-878D-41C5C083E9B9}" type="slidenum">
               <a:rPr lang="en-US" smtClean="0"/>
-              <a:t>30</a:t>
+              <a:t>31</a:t>
             </a:fld>
             <a:endParaRPr lang="en-US"/>
           </a:p>
@@ -14851,7 +15396,7 @@
           <a:p>
             <a:fld id="{737EB954-88EE-45B2-878D-41C5C083E9B9}" type="slidenum">
               <a:rPr lang="en-US" smtClean="0"/>
-              <a:t>31</a:t>
+              <a:t>32</a:t>
             </a:fld>
             <a:endParaRPr lang="en-US"/>
           </a:p>
@@ -15830,7 +16375,7 @@
             <a:fld id="{1D8BD707-D9CF-40AE-B4C6-C98DA3205C09}" type="datetimeFigureOut">
               <a:rPr lang="en-US" smtClean="0"/>
               <a:pPr/>
-              <a:t>5/9/2014</a:t>
+              <a:t>5/19/2014</a:t>
             </a:fld>
             <a:endParaRPr lang="en-US"/>
           </a:p>
@@ -15997,7 +16542,7 @@
             <a:fld id="{1D8BD707-D9CF-40AE-B4C6-C98DA3205C09}" type="datetimeFigureOut">
               <a:rPr lang="en-US" smtClean="0"/>
               <a:pPr/>
-              <a:t>5/9/2014</a:t>
+              <a:t>5/19/2014</a:t>
             </a:fld>
             <a:endParaRPr lang="en-US"/>
           </a:p>
@@ -16174,7 +16719,7 @@
             <a:fld id="{1D8BD707-D9CF-40AE-B4C6-C98DA3205C09}" type="datetimeFigureOut">
               <a:rPr lang="en-US" smtClean="0"/>
               <a:pPr/>
-              <a:t>5/9/2014</a:t>
+              <a:t>5/19/2014</a:t>
             </a:fld>
             <a:endParaRPr lang="en-US"/>
           </a:p>
@@ -16419,7 +16964,7 @@
                 </a:solidFill>
               </a:rPr>
               <a:pPr/>
-              <a:t>5/9/2014</a:t>
+              <a:t>5/19/2014</a:t>
             </a:fld>
             <a:endParaRPr lang="en-US">
               <a:solidFill>
@@ -16646,7 +17191,7 @@
                 </a:solidFill>
               </a:rPr>
               <a:pPr/>
-              <a:t>5/9/2014</a:t>
+              <a:t>5/19/2014</a:t>
             </a:fld>
             <a:endParaRPr lang="en-US">
               <a:solidFill>
@@ -16924,7 +17469,7 @@
                 </a:solidFill>
               </a:rPr>
               <a:pPr/>
-              <a:t>5/9/2014</a:t>
+              <a:t>5/19/2014</a:t>
             </a:fld>
             <a:endParaRPr lang="en-US">
               <a:solidFill>
@@ -17244,7 +17789,7 @@
                 </a:solidFill>
               </a:rPr>
               <a:pPr/>
-              <a:t>5/9/2014</a:t>
+              <a:t>5/19/2014</a:t>
             </a:fld>
             <a:endParaRPr lang="en-US">
               <a:solidFill>
@@ -17703,7 +18248,7 @@
                 </a:solidFill>
               </a:rPr>
               <a:pPr/>
-              <a:t>5/9/2014</a:t>
+              <a:t>5/19/2014</a:t>
             </a:fld>
             <a:endParaRPr lang="en-US">
               <a:solidFill>
@@ -17853,7 +18398,7 @@
                 </a:solidFill>
               </a:rPr>
               <a:pPr/>
-              <a:t>5/9/2014</a:t>
+              <a:t>5/19/2014</a:t>
             </a:fld>
             <a:endParaRPr lang="en-US">
               <a:solidFill>
@@ -17980,7 +18525,7 @@
                 </a:solidFill>
               </a:rPr>
               <a:pPr/>
-              <a:t>5/9/2014</a:t>
+              <a:t>5/19/2014</a:t>
             </a:fld>
             <a:endParaRPr lang="en-US">
               <a:solidFill>
@@ -18289,7 +18834,7 @@
                 </a:solidFill>
               </a:rPr>
               <a:pPr/>
-              <a:t>5/9/2014</a:t>
+              <a:t>5/19/2014</a:t>
             </a:fld>
             <a:endParaRPr lang="en-US">
               <a:solidFill>
@@ -18485,7 +19030,7 @@
             <a:fld id="{1D8BD707-D9CF-40AE-B4C6-C98DA3205C09}" type="datetimeFigureOut">
               <a:rPr lang="en-US" smtClean="0"/>
               <a:pPr/>
-              <a:t>5/9/2014</a:t>
+              <a:t>5/19/2014</a:t>
             </a:fld>
             <a:endParaRPr lang="en-US"/>
           </a:p>
@@ -18741,7 +19286,7 @@
                 </a:solidFill>
               </a:rPr>
               <a:pPr/>
-              <a:t>5/9/2014</a:t>
+              <a:t>5/19/2014</a:t>
             </a:fld>
             <a:endParaRPr lang="en-US">
               <a:solidFill>
@@ -18943,7 +19488,7 @@
                 </a:solidFill>
               </a:rPr>
               <a:pPr/>
-              <a:t>5/9/2014</a:t>
+              <a:t>5/19/2014</a:t>
             </a:fld>
             <a:endParaRPr lang="en-US">
               <a:solidFill>
@@ -19155,7 +19700,7 @@
                 </a:solidFill>
               </a:rPr>
               <a:pPr/>
-              <a:t>5/9/2014</a:t>
+              <a:t>5/19/2014</a:t>
             </a:fld>
             <a:endParaRPr lang="en-US">
               <a:solidFill>
@@ -19429,7 +19974,7 @@
                 </a:solidFill>
               </a:rPr>
               <a:pPr/>
-              <a:t>5/9/2014</a:t>
+              <a:t>5/19/2014</a:t>
             </a:fld>
             <a:endParaRPr lang="en-US">
               <a:solidFill>
@@ -19656,7 +20201,7 @@
                 </a:solidFill>
               </a:rPr>
               <a:pPr/>
-              <a:t>5/9/2014</a:t>
+              <a:t>5/19/2014</a:t>
             </a:fld>
             <a:endParaRPr lang="en-US">
               <a:solidFill>
@@ -19934,7 +20479,7 @@
                 </a:solidFill>
               </a:rPr>
               <a:pPr/>
-              <a:t>5/9/2014</a:t>
+              <a:t>5/19/2014</a:t>
             </a:fld>
             <a:endParaRPr lang="en-US">
               <a:solidFill>
@@ -20254,7 +20799,7 @@
                 </a:solidFill>
               </a:rPr>
               <a:pPr/>
-              <a:t>5/9/2014</a:t>
+              <a:t>5/19/2014</a:t>
             </a:fld>
             <a:endParaRPr lang="en-US">
               <a:solidFill>
@@ -20713,7 +21258,7 @@
                 </a:solidFill>
               </a:rPr>
               <a:pPr/>
-              <a:t>5/9/2014</a:t>
+              <a:t>5/19/2014</a:t>
             </a:fld>
             <a:endParaRPr lang="en-US">
               <a:solidFill>
@@ -20863,7 +21408,7 @@
                 </a:solidFill>
               </a:rPr>
               <a:pPr/>
-              <a:t>5/9/2014</a:t>
+              <a:t>5/19/2014</a:t>
             </a:fld>
             <a:endParaRPr lang="en-US">
               <a:solidFill>
@@ -20990,7 +21535,7 @@
                 </a:solidFill>
               </a:rPr>
               <a:pPr/>
-              <a:t>5/9/2014</a:t>
+              <a:t>5/19/2014</a:t>
             </a:fld>
             <a:endParaRPr lang="en-US">
               <a:solidFill>
@@ -21262,7 +21807,7 @@
             <a:fld id="{1D8BD707-D9CF-40AE-B4C6-C98DA3205C09}" type="datetimeFigureOut">
               <a:rPr lang="en-US" smtClean="0"/>
               <a:pPr/>
-              <a:t>5/9/2014</a:t>
+              <a:t>5/19/2014</a:t>
             </a:fld>
             <a:endParaRPr lang="en-US"/>
           </a:p>
@@ -21542,7 +22087,7 @@
                 </a:solidFill>
               </a:rPr>
               <a:pPr/>
-              <a:t>5/9/2014</a:t>
+              <a:t>5/19/2014</a:t>
             </a:fld>
             <a:endParaRPr lang="en-US">
               <a:solidFill>
@@ -21827,7 +22372,7 @@
                 </a:solidFill>
               </a:rPr>
               <a:pPr/>
-              <a:t>5/9/2014</a:t>
+              <a:t>5/19/2014</a:t>
             </a:fld>
             <a:endParaRPr lang="en-US">
               <a:solidFill>
@@ -22029,7 +22574,7 @@
                 </a:solidFill>
               </a:rPr>
               <a:pPr/>
-              <a:t>5/9/2014</a:t>
+              <a:t>5/19/2014</a:t>
             </a:fld>
             <a:endParaRPr lang="en-US">
               <a:solidFill>
@@ -22241,7 +22786,7 @@
                 </a:solidFill>
               </a:rPr>
               <a:pPr/>
-              <a:t>5/9/2014</a:t>
+              <a:t>5/19/2014</a:t>
             </a:fld>
             <a:endParaRPr lang="en-US">
               <a:solidFill>
@@ -22515,7 +23060,7 @@
                 </a:solidFill>
               </a:rPr>
               <a:pPr/>
-              <a:t>5/9/2014</a:t>
+              <a:t>5/19/2014</a:t>
             </a:fld>
             <a:endParaRPr lang="en-US">
               <a:solidFill>
@@ -22742,7 +23287,7 @@
                 </a:solidFill>
               </a:rPr>
               <a:pPr/>
-              <a:t>5/9/2014</a:t>
+              <a:t>5/19/2014</a:t>
             </a:fld>
             <a:endParaRPr lang="en-US">
               <a:solidFill>
@@ -23020,7 +23565,7 @@
                 </a:solidFill>
               </a:rPr>
               <a:pPr/>
-              <a:t>5/9/2014</a:t>
+              <a:t>5/19/2014</a:t>
             </a:fld>
             <a:endParaRPr lang="en-US">
               <a:solidFill>
@@ -23340,7 +23885,7 @@
                 </a:solidFill>
               </a:rPr>
               <a:pPr/>
-              <a:t>5/9/2014</a:t>
+              <a:t>5/19/2014</a:t>
             </a:fld>
             <a:endParaRPr lang="en-US">
               <a:solidFill>
@@ -23799,7 +24344,7 @@
                 </a:solidFill>
               </a:rPr>
               <a:pPr/>
-              <a:t>5/9/2014</a:t>
+              <a:t>5/19/2014</a:t>
             </a:fld>
             <a:endParaRPr lang="en-US">
               <a:solidFill>
@@ -23949,7 +24494,7 @@
                 </a:solidFill>
               </a:rPr>
               <a:pPr/>
-              <a:t>5/9/2014</a:t>
+              <a:t>5/19/2014</a:t>
             </a:fld>
             <a:endParaRPr lang="en-US">
               <a:solidFill>
@@ -24263,7 +24808,7 @@
             <a:fld id="{1D8BD707-D9CF-40AE-B4C6-C98DA3205C09}" type="datetimeFigureOut">
               <a:rPr lang="en-US" smtClean="0"/>
               <a:pPr/>
-              <a:t>5/9/2014</a:t>
+              <a:t>5/19/2014</a:t>
             </a:fld>
             <a:endParaRPr lang="en-US"/>
           </a:p>
@@ -24361,7 +24906,7 @@
                 </a:solidFill>
               </a:rPr>
               <a:pPr/>
-              <a:t>5/9/2014</a:t>
+              <a:t>5/19/2014</a:t>
             </a:fld>
             <a:endParaRPr lang="en-US">
               <a:solidFill>
@@ -24670,7 +25215,7 @@
                 </a:solidFill>
               </a:rPr>
               <a:pPr/>
-              <a:t>5/9/2014</a:t>
+              <a:t>5/19/2014</a:t>
             </a:fld>
             <a:endParaRPr lang="en-US">
               <a:solidFill>
@@ -24955,7 +25500,7 @@
                 </a:solidFill>
               </a:rPr>
               <a:pPr/>
-              <a:t>5/9/2014</a:t>
+              <a:t>5/19/2014</a:t>
             </a:fld>
             <a:endParaRPr lang="en-US">
               <a:solidFill>
@@ -25157,7 +25702,7 @@
                 </a:solidFill>
               </a:rPr>
               <a:pPr/>
-              <a:t>5/9/2014</a:t>
+              <a:t>5/19/2014</a:t>
             </a:fld>
             <a:endParaRPr lang="en-US">
               <a:solidFill>
@@ -25369,7 +25914,7 @@
                 </a:solidFill>
               </a:rPr>
               <a:pPr/>
-              <a:t>5/9/2014</a:t>
+              <a:t>5/19/2014</a:t>
             </a:fld>
             <a:endParaRPr lang="en-US">
               <a:solidFill>
@@ -25817,7 +26362,7 @@
             <a:fld id="{1D8BD707-D9CF-40AE-B4C6-C98DA3205C09}" type="datetimeFigureOut">
               <a:rPr lang="en-US" smtClean="0"/>
               <a:pPr/>
-              <a:t>5/9/2014</a:t>
+              <a:t>5/19/2014</a:t>
             </a:fld>
             <a:endParaRPr lang="en-US"/>
           </a:p>
@@ -25932,7 +26477,7 @@
             <a:fld id="{1D8BD707-D9CF-40AE-B4C6-C98DA3205C09}" type="datetimeFigureOut">
               <a:rPr lang="en-US" smtClean="0"/>
               <a:pPr/>
-              <a:t>5/9/2014</a:t>
+              <a:t>5/19/2014</a:t>
             </a:fld>
             <a:endParaRPr lang="en-US"/>
           </a:p>
@@ -26024,7 +26569,7 @@
             <a:fld id="{1D8BD707-D9CF-40AE-B4C6-C98DA3205C09}" type="datetimeFigureOut">
               <a:rPr lang="en-US" smtClean="0"/>
               <a:pPr/>
-              <a:t>5/9/2014</a:t>
+              <a:t>5/19/2014</a:t>
             </a:fld>
             <a:endParaRPr lang="en-US"/>
           </a:p>
@@ -26298,7 +26843,7 @@
             <a:fld id="{1D8BD707-D9CF-40AE-B4C6-C98DA3205C09}" type="datetimeFigureOut">
               <a:rPr lang="en-US" smtClean="0"/>
               <a:pPr/>
-              <a:t>5/9/2014</a:t>
+              <a:t>5/19/2014</a:t>
             </a:fld>
             <a:endParaRPr lang="en-US"/>
           </a:p>
@@ -26548,7 +27093,7 @@
             <a:fld id="{1D8BD707-D9CF-40AE-B4C6-C98DA3205C09}" type="datetimeFigureOut">
               <a:rPr lang="en-US" smtClean="0"/>
               <a:pPr/>
-              <a:t>5/9/2014</a:t>
+              <a:t>5/19/2014</a:t>
             </a:fld>
             <a:endParaRPr lang="en-US"/>
           </a:p>
@@ -26758,7 +27303,7 @@
             <a:fld id="{1D8BD707-D9CF-40AE-B4C6-C98DA3205C09}" type="datetimeFigureOut">
               <a:rPr lang="en-US" smtClean="0"/>
               <a:pPr/>
-              <a:t>5/9/2014</a:t>
+              <a:t>5/19/2014</a:t>
             </a:fld>
             <a:endParaRPr lang="en-US"/>
           </a:p>
@@ -27276,7 +27821,7 @@
                 </a:solidFill>
               </a:rPr>
               <a:pPr defTabSz="609585"/>
-              <a:t>5/9/2014</a:t>
+              <a:t>5/19/2014</a:t>
             </a:fld>
             <a:endParaRPr lang="en-US" dirty="0">
               <a:solidFill>
@@ -27831,7 +28376,7 @@
                 </a:solidFill>
               </a:rPr>
               <a:pPr defTabSz="609585"/>
-              <a:t>5/9/2014</a:t>
+              <a:t>5/19/2014</a:t>
             </a:fld>
             <a:endParaRPr lang="en-US" dirty="0">
               <a:solidFill>
@@ -28386,7 +28931,7 @@
                 </a:solidFill>
               </a:rPr>
               <a:pPr defTabSz="609585"/>
-              <a:t>5/9/2014</a:t>
+              <a:t>5/19/2014</a:t>
             </a:fld>
             <a:endParaRPr lang="en-US" dirty="0">
               <a:solidFill>
@@ -28941,11 +29486,11 @@
   <p:clrMapOvr>
     <a:masterClrMapping/>
   </p:clrMapOvr>
-  <mc:AlternateContent xmlns:mc="http://schemas.openxmlformats.org/markup-compatibility/2006">
-    <mc:Choice xmlns:p14="http://schemas.microsoft.com/office/powerpoint/2010/main" Requires="p14">
+  <mc:AlternateContent xmlns:mc="http://schemas.openxmlformats.org/markup-compatibility/2006" xmlns:p14="http://schemas.microsoft.com/office/powerpoint/2010/main">
+    <mc:Choice Requires="p14">
       <p:transition spd="slow" p14:dur="2000"/>
     </mc:Choice>
-    <mc:Fallback>
+    <mc:Fallback xmlns="">
       <p:transition spd="slow"/>
     </mc:Fallback>
   </mc:AlternateContent>
@@ -30446,7 +30991,7 @@
           <a:p>
             <a:r>
               <a:rPr lang="en-US" dirty="0" smtClean="0"/>
-              <a:t>Our Story</a:t>
+              <a:t>Structure of Tests</a:t>
             </a:r>
             <a:endParaRPr lang="en-US" dirty="0"/>
           </a:p>
@@ -30469,35 +31014,34 @@
           <a:p>
             <a:r>
               <a:rPr lang="en-US" dirty="0" smtClean="0"/>
-              <a:t>This is our app and we need to enhance it</a:t>
-            </a:r>
-          </a:p>
-          <a:p>
-            <a:pPr lvl="1"/>
+              <a:t>Assemble</a:t>
+            </a:r>
+          </a:p>
+          <a:p>
             <a:r>
               <a:rPr lang="en-US" dirty="0" smtClean="0"/>
-              <a:t>We need to add a table to hold the images for articles.</a:t>
-            </a:r>
+              <a:t>Act</a:t>
+            </a:r>
+          </a:p>
+          <a:p>
+            <a:r>
+              <a:rPr lang="en-US" dirty="0" smtClean="0"/>
+              <a:t>Assert</a:t>
+            </a:r>
+            <a:endParaRPr lang="en-US" dirty="0"/>
           </a:p>
         </p:txBody>
       </p:sp>
     </p:spTree>
     <p:extLst>
       <p:ext uri="{BB962C8B-B14F-4D97-AF65-F5344CB8AC3E}">
-        <p14:creationId xmlns:p14="http://schemas.microsoft.com/office/powerpoint/2010/main" val="2542757025"/>
+        <p14:creationId xmlns:p14="http://schemas.microsoft.com/office/powerpoint/2010/main" val="1962894459"/>
       </p:ext>
     </p:extLst>
   </p:cSld>
   <p:clrMapOvr>
     <a:masterClrMapping/>
   </p:clrMapOvr>
-  <p:timing>
-    <p:tnLst>
-      <p:par>
-        <p:cTn id="1" dur="indefinite" restart="never" nodeType="tmRoot"/>
-      </p:par>
-    </p:tnLst>
-  </p:timing>
 </p:sld>
 </file>
 
@@ -30535,7 +31079,7 @@
           <a:p>
             <a:r>
               <a:rPr lang="en-US" dirty="0" smtClean="0"/>
-              <a:t>Demo</a:t>
+              <a:t>Our Story</a:t>
             </a:r>
             <a:endParaRPr lang="en-US" dirty="0"/>
           </a:p>
@@ -30558,29 +31102,44 @@
           <a:p>
             <a:r>
               <a:rPr lang="en-US" dirty="0" smtClean="0"/>
-              <a:t>Demo that shows how we build a table that doesn’t follow good practices. Use </a:t>
-            </a:r>
-            <a:r>
-              <a:rPr lang="en-US" dirty="0" err="1" smtClean="0"/>
-              <a:t>tblProductImages</a:t>
-            </a:r>
+              <a:t>We need to refactor and adjust the reading time for articles</a:t>
+            </a:r>
+          </a:p>
+          <a:p>
+            <a:pPr lvl="1"/>
             <a:r>
               <a:rPr lang="en-US" dirty="0" smtClean="0"/>
-              <a:t> as a table name</a:t>
-            </a:r>
-          </a:p>
-          <a:p>
+              <a:t>Add a column to our table</a:t>
+            </a:r>
+          </a:p>
+          <a:p>
+            <a:pPr lvl="1"/>
             <a:r>
               <a:rPr lang="en-US" dirty="0" smtClean="0"/>
-              <a:t>SQL Cop catches an error. Actually catches two, name and no PK.</a:t>
-            </a:r>
+              <a:t>Add a procedure to calculate the time</a:t>
+            </a:r>
+          </a:p>
+          <a:p>
+            <a:pPr lvl="1"/>
+            <a:r>
+              <a:rPr lang="en-US" dirty="0" smtClean="0"/>
+              <a:t>Adjust the function</a:t>
+            </a:r>
+          </a:p>
+          <a:p>
+            <a:pPr lvl="1"/>
+            <a:r>
+              <a:rPr lang="en-US" smtClean="0"/>
+              <a:t>Add tests</a:t>
+            </a:r>
+            <a:endParaRPr lang="en-US" dirty="0" smtClean="0"/>
           </a:p>
         </p:txBody>
       </p:sp>
     </p:spTree>
     <p:extLst>
       <p:ext uri="{BB962C8B-B14F-4D97-AF65-F5344CB8AC3E}">
-        <p14:creationId xmlns:p14="http://schemas.microsoft.com/office/powerpoint/2010/main" val="1400053330"/>
+        <p14:creationId xmlns:p14="http://schemas.microsoft.com/office/powerpoint/2010/main" val="2542757025"/>
       </p:ext>
     </p:extLst>
   </p:cSld>
@@ -30631,7 +31190,7 @@
           <a:p>
             <a:r>
               <a:rPr lang="en-US" dirty="0" smtClean="0"/>
-              <a:t>Standards Tests</a:t>
+              <a:t>Demo</a:t>
             </a:r>
             <a:endParaRPr lang="en-US" dirty="0"/>
           </a:p>
@@ -30654,23 +31213,21 @@
           <a:p>
             <a:r>
               <a:rPr lang="en-US" dirty="0" smtClean="0"/>
-              <a:t>Ensure that the standards you care about are followed.</a:t>
-            </a:r>
-          </a:p>
-          <a:p>
+              <a:t>Demo that shows how we build a table that doesn’t follow good practices. Use </a:t>
+            </a:r>
             <a:r>
               <a:rPr lang="en-US" dirty="0" err="1" smtClean="0"/>
-              <a:t>SQLCop</a:t>
+              <a:t>tblProductImages</a:t>
             </a:r>
             <a:r>
               <a:rPr lang="en-US" dirty="0" smtClean="0"/>
-              <a:t> – sqlcop.lessthandot.com</a:t>
+              <a:t> as a table name</a:t>
             </a:r>
           </a:p>
           <a:p>
             <a:r>
               <a:rPr lang="en-US" dirty="0" smtClean="0"/>
-              <a:t>Easy to write your own.</a:t>
+              <a:t>SQL Cop catches an error. Actually catches two, name and no PK.</a:t>
             </a:r>
           </a:p>
         </p:txBody>
@@ -30678,7 +31235,7 @@
     </p:spTree>
     <p:extLst>
       <p:ext uri="{BB962C8B-B14F-4D97-AF65-F5344CB8AC3E}">
-        <p14:creationId xmlns:p14="http://schemas.microsoft.com/office/powerpoint/2010/main" val="1619672544"/>
+        <p14:creationId xmlns:p14="http://schemas.microsoft.com/office/powerpoint/2010/main" val="1400053330"/>
       </p:ext>
     </p:extLst>
   </p:cSld>
@@ -30729,7 +31286,7 @@
           <a:p>
             <a:r>
               <a:rPr lang="en-US" dirty="0" smtClean="0"/>
-              <a:t>Our Story</a:t>
+              <a:t>Standards Tests</a:t>
             </a:r>
             <a:endParaRPr lang="en-US" dirty="0"/>
           </a:p>
@@ -30752,21 +31309,23 @@
           <a:p>
             <a:r>
               <a:rPr lang="en-US" dirty="0" smtClean="0"/>
-              <a:t>This is our app and we need to enhance it</a:t>
-            </a:r>
-          </a:p>
-          <a:p>
-            <a:pPr lvl="1"/>
+              <a:t>Ensure that the standards you care about are followed.</a:t>
+            </a:r>
+          </a:p>
+          <a:p>
+            <a:r>
+              <a:rPr lang="en-US" dirty="0" err="1" smtClean="0"/>
+              <a:t>SQLCop</a:t>
+            </a:r>
             <a:r>
               <a:rPr lang="en-US" dirty="0" smtClean="0"/>
-              <a:t>We need to add a table to hold the images for articles.</a:t>
-            </a:r>
-          </a:p>
-          <a:p>
-            <a:pPr lvl="1"/>
+              <a:t> – sqlcop.lessthandot.com</a:t>
+            </a:r>
+          </a:p>
+          <a:p>
             <a:r>
               <a:rPr lang="en-US" dirty="0" smtClean="0"/>
-              <a:t>Let’s write a procedures to insert and select back images</a:t>
+              <a:t>Easy to write your own.</a:t>
             </a:r>
           </a:p>
         </p:txBody>
@@ -30774,7 +31333,7 @@
     </p:spTree>
     <p:extLst>
       <p:ext uri="{BB962C8B-B14F-4D97-AF65-F5344CB8AC3E}">
-        <p14:creationId xmlns:p14="http://schemas.microsoft.com/office/powerpoint/2010/main" val="3492864798"/>
+        <p14:creationId xmlns:p14="http://schemas.microsoft.com/office/powerpoint/2010/main" val="1619672544"/>
       </p:ext>
     </p:extLst>
   </p:cSld>
@@ -30825,7 +31384,7 @@
           <a:p>
             <a:r>
               <a:rPr lang="en-US" dirty="0" smtClean="0"/>
-              <a:t>Demo</a:t>
+              <a:t>Our Story</a:t>
             </a:r>
             <a:endParaRPr lang="en-US" dirty="0"/>
           </a:p>
@@ -30848,42 +31407,29 @@
           <a:p>
             <a:r>
               <a:rPr lang="en-US" dirty="0" smtClean="0"/>
-              <a:t>Write </a:t>
-            </a:r>
-            <a:r>
-              <a:rPr lang="en-US" dirty="0" err="1" smtClean="0"/>
-              <a:t>proc</a:t>
-            </a:r>
+              <a:t>This is our app and we need to enhance it</a:t>
+            </a:r>
+          </a:p>
+          <a:p>
+            <a:pPr lvl="1"/>
             <a:r>
               <a:rPr lang="en-US" dirty="0" smtClean="0"/>
-              <a:t> for insert and select of images</a:t>
-            </a:r>
-          </a:p>
-          <a:p>
+              <a:t>We need to add a table to hold the images for articles.</a:t>
+            </a:r>
+          </a:p>
+          <a:p>
+            <a:pPr lvl="1"/>
             <a:r>
               <a:rPr lang="en-US" dirty="0" smtClean="0"/>
-              <a:t>Write tests for each</a:t>
-            </a:r>
-          </a:p>
-          <a:p>
-            <a:r>
-              <a:rPr lang="en-US" dirty="0" smtClean="0"/>
-              <a:t>Run tests, get caught naming issues, as well as one procedure works, one fails.</a:t>
-            </a:r>
-          </a:p>
-          <a:p>
-            <a:r>
-              <a:rPr lang="en-US" dirty="0" smtClean="0"/>
-              <a:t>Correct issues in both procedures</a:t>
-            </a:r>
-            <a:endParaRPr lang="en-US" dirty="0"/>
+              <a:t>Let’s write a procedures to insert and select back images</a:t>
+            </a:r>
           </a:p>
         </p:txBody>
       </p:sp>
     </p:spTree>
     <p:extLst>
       <p:ext uri="{BB962C8B-B14F-4D97-AF65-F5344CB8AC3E}">
-        <p14:creationId xmlns:p14="http://schemas.microsoft.com/office/powerpoint/2010/main" val="3500483053"/>
+        <p14:creationId xmlns:p14="http://schemas.microsoft.com/office/powerpoint/2010/main" val="3492864798"/>
       </p:ext>
     </p:extLst>
   </p:cSld>
@@ -31763,11 +32309,11 @@
   <p:clrMapOvr>
     <a:masterClrMapping/>
   </p:clrMapOvr>
-  <mc:AlternateContent xmlns:mc="http://schemas.openxmlformats.org/markup-compatibility/2006">
-    <mc:Choice xmlns:p14="http://schemas.microsoft.com/office/powerpoint/2010/main" Requires="p14">
+  <mc:AlternateContent xmlns:mc="http://schemas.openxmlformats.org/markup-compatibility/2006" xmlns:p14="http://schemas.microsoft.com/office/powerpoint/2010/main">
+    <mc:Choice Requires="p14">
       <p:transition spd="slow" p14:dur="2000"/>
     </mc:Choice>
-    <mc:Fallback>
+    <mc:Fallback xmlns="">
       <p:transition spd="slow"/>
     </mc:Fallback>
   </mc:AlternateContent>
@@ -32653,7 +33199,7 @@
           <a:p>
             <a:r>
               <a:rPr lang="en-US" dirty="0" smtClean="0"/>
-              <a:t>Logic Tests</a:t>
+              <a:t>Demo</a:t>
             </a:r>
             <a:endParaRPr lang="en-US" dirty="0"/>
           </a:p>
@@ -32676,7 +33222,33 @@
           <a:p>
             <a:r>
               <a:rPr lang="en-US" dirty="0" smtClean="0"/>
-              <a:t>These are unit tests designed to find issues with a particular specific function</a:t>
+              <a:t>Write </a:t>
+            </a:r>
+            <a:r>
+              <a:rPr lang="en-US" dirty="0" err="1" smtClean="0"/>
+              <a:t>proc</a:t>
+            </a:r>
+            <a:r>
+              <a:rPr lang="en-US" dirty="0" smtClean="0"/>
+              <a:t> for insert and select of images</a:t>
+            </a:r>
+          </a:p>
+          <a:p>
+            <a:r>
+              <a:rPr lang="en-US" dirty="0" smtClean="0"/>
+              <a:t>Write tests for each</a:t>
+            </a:r>
+          </a:p>
+          <a:p>
+            <a:r>
+              <a:rPr lang="en-US" dirty="0" smtClean="0"/>
+              <a:t>Run tests, get caught naming issues, as well as one procedure works, one fails.</a:t>
+            </a:r>
+          </a:p>
+          <a:p>
+            <a:r>
+              <a:rPr lang="en-US" dirty="0" smtClean="0"/>
+              <a:t>Correct issues in both procedures</a:t>
             </a:r>
             <a:endParaRPr lang="en-US" dirty="0"/>
           </a:p>
@@ -32685,7 +33257,7 @@
     </p:spTree>
     <p:extLst>
       <p:ext uri="{BB962C8B-B14F-4D97-AF65-F5344CB8AC3E}">
-        <p14:creationId xmlns:p14="http://schemas.microsoft.com/office/powerpoint/2010/main" val="2549004961"/>
+        <p14:creationId xmlns:p14="http://schemas.microsoft.com/office/powerpoint/2010/main" val="3500483053"/>
       </p:ext>
     </p:extLst>
   </p:cSld>
@@ -32736,7 +33308,7 @@
           <a:p>
             <a:r>
               <a:rPr lang="en-US" dirty="0" smtClean="0"/>
-              <a:t>Our Story</a:t>
+              <a:t>Logic Tests</a:t>
             </a:r>
             <a:endParaRPr lang="en-US" dirty="0"/>
           </a:p>
@@ -32759,36 +33331,16 @@
           <a:p>
             <a:r>
               <a:rPr lang="en-US" dirty="0" smtClean="0"/>
-              <a:t>This is our app and we need to enhance it</a:t>
-            </a:r>
-          </a:p>
-          <a:p>
-            <a:pPr lvl="1"/>
-            <a:r>
-              <a:rPr lang="en-US" dirty="0" smtClean="0"/>
-              <a:t>We need to add a table to hold the images for articles.</a:t>
-            </a:r>
-          </a:p>
-          <a:p>
-            <a:pPr lvl="1"/>
-            <a:r>
-              <a:rPr lang="en-US" dirty="0" smtClean="0"/>
-              <a:t>Let’s write a procedures to insert and select back images</a:t>
-            </a:r>
-          </a:p>
-          <a:p>
-            <a:pPr lvl="1"/>
-            <a:r>
-              <a:rPr lang="en-US" dirty="0" smtClean="0"/>
-              <a:t>More complex logic, refactoring a a procedure that can query for some type of aggregate</a:t>
-            </a:r>
+              <a:t>These are unit tests designed to find issues with a particular specific function</a:t>
+            </a:r>
+            <a:endParaRPr lang="en-US" dirty="0"/>
           </a:p>
         </p:txBody>
       </p:sp>
     </p:spTree>
     <p:extLst>
       <p:ext uri="{BB962C8B-B14F-4D97-AF65-F5344CB8AC3E}">
-        <p14:creationId xmlns:p14="http://schemas.microsoft.com/office/powerpoint/2010/main" val="4238152070"/>
+        <p14:creationId xmlns:p14="http://schemas.microsoft.com/office/powerpoint/2010/main" val="2549004961"/>
       </p:ext>
     </p:extLst>
   </p:cSld>
@@ -32839,7 +33391,7 @@
           <a:p>
             <a:r>
               <a:rPr lang="en-US" dirty="0" smtClean="0"/>
-              <a:t>Demo</a:t>
+              <a:t>Our Story</a:t>
             </a:r>
             <a:endParaRPr lang="en-US" dirty="0"/>
           </a:p>
@@ -32862,33 +33414,36 @@
           <a:p>
             <a:r>
               <a:rPr lang="en-US" dirty="0" smtClean="0"/>
-              <a:t>Alter the procedure  to meet the new logic</a:t>
-            </a:r>
-          </a:p>
-          <a:p>
+              <a:t>This is our app and we need to enhance it</a:t>
+            </a:r>
+          </a:p>
+          <a:p>
+            <a:pPr lvl="1"/>
             <a:r>
               <a:rPr lang="en-US" dirty="0" smtClean="0"/>
-              <a:t>Write test for the </a:t>
-            </a:r>
-            <a:r>
-              <a:rPr lang="en-US" dirty="0" err="1" smtClean="0"/>
-              <a:t>proc</a:t>
-            </a:r>
-            <a:endParaRPr lang="en-US" dirty="0" smtClean="0"/>
-          </a:p>
-          <a:p>
+              <a:t>We need to add a table to hold the images for articles.</a:t>
+            </a:r>
+          </a:p>
+          <a:p>
+            <a:pPr lvl="1"/>
             <a:r>
               <a:rPr lang="en-US" dirty="0" smtClean="0"/>
-              <a:t>Run tests, have new test work, some other, older test that now fails.</a:t>
-            </a:r>
-            <a:endParaRPr lang="en-US" dirty="0"/>
+              <a:t>Let’s write a procedures to insert and select back images</a:t>
+            </a:r>
+          </a:p>
+          <a:p>
+            <a:pPr lvl="1"/>
+            <a:r>
+              <a:rPr lang="en-US" dirty="0" smtClean="0"/>
+              <a:t>More complex logic, refactoring a a procedure that can query for some type of aggregate</a:t>
+            </a:r>
           </a:p>
         </p:txBody>
       </p:sp>
     </p:spTree>
     <p:extLst>
       <p:ext uri="{BB962C8B-B14F-4D97-AF65-F5344CB8AC3E}">
-        <p14:creationId xmlns:p14="http://schemas.microsoft.com/office/powerpoint/2010/main" val="1745970449"/>
+        <p14:creationId xmlns:p14="http://schemas.microsoft.com/office/powerpoint/2010/main" val="4238152070"/>
       </p:ext>
     </p:extLst>
   </p:cSld>
@@ -32939,7 +33494,7 @@
           <a:p>
             <a:r>
               <a:rPr lang="en-US" dirty="0" smtClean="0"/>
-              <a:t>Having a Test Suite</a:t>
+              <a:t>Demo</a:t>
             </a:r>
             <a:endParaRPr lang="en-US" dirty="0"/>
           </a:p>
@@ -32962,19 +33517,24 @@
           <a:p>
             <a:r>
               <a:rPr lang="en-US" dirty="0" smtClean="0"/>
-              <a:t>By continuing to grow your test suite with each change, developers spread the load</a:t>
+              <a:t>Alter the procedure  to meet the new logic</a:t>
             </a:r>
           </a:p>
           <a:p>
             <a:r>
               <a:rPr lang="en-US" dirty="0" smtClean="0"/>
-              <a:t>By having a large suite, we have better code coverage.</a:t>
-            </a:r>
+              <a:t>Write test for the </a:t>
+            </a:r>
+            <a:r>
+              <a:rPr lang="en-US" dirty="0" err="1" smtClean="0"/>
+              <a:t>proc</a:t>
+            </a:r>
+            <a:endParaRPr lang="en-US" dirty="0" smtClean="0"/>
           </a:p>
           <a:p>
             <a:r>
               <a:rPr lang="en-US" dirty="0" smtClean="0"/>
-              <a:t>We can easily regression test.</a:t>
+              <a:t>Run tests, have new test work, some other, older test that now fails.</a:t>
             </a:r>
             <a:endParaRPr lang="en-US" dirty="0"/>
           </a:p>
@@ -32983,7 +33543,7 @@
     </p:spTree>
     <p:extLst>
       <p:ext uri="{BB962C8B-B14F-4D97-AF65-F5344CB8AC3E}">
-        <p14:creationId xmlns:p14="http://schemas.microsoft.com/office/powerpoint/2010/main" val="2479422556"/>
+        <p14:creationId xmlns:p14="http://schemas.microsoft.com/office/powerpoint/2010/main" val="1745970449"/>
       </p:ext>
     </p:extLst>
   </p:cSld>
@@ -33034,6 +33594,101 @@
           <a:p>
             <a:r>
               <a:rPr lang="en-US" dirty="0" smtClean="0"/>
+              <a:t>Having a Test Suite</a:t>
+            </a:r>
+            <a:endParaRPr lang="en-US" dirty="0"/>
+          </a:p>
+        </p:txBody>
+      </p:sp>
+      <p:sp>
+        <p:nvSpPr>
+          <p:cNvPr id="3" name="Content Placeholder 2"/>
+          <p:cNvSpPr>
+            <a:spLocks noGrp="1"/>
+          </p:cNvSpPr>
+          <p:nvPr>
+            <p:ph idx="1"/>
+          </p:nvPr>
+        </p:nvSpPr>
+        <p:spPr/>
+        <p:txBody>
+          <a:bodyPr/>
+          <a:lstStyle/>
+          <a:p>
+            <a:r>
+              <a:rPr lang="en-US" dirty="0" smtClean="0"/>
+              <a:t>By continuing to grow your test suite with each change, developers spread the load</a:t>
+            </a:r>
+          </a:p>
+          <a:p>
+            <a:r>
+              <a:rPr lang="en-US" dirty="0" smtClean="0"/>
+              <a:t>By having a large suite, we have better code coverage.</a:t>
+            </a:r>
+          </a:p>
+          <a:p>
+            <a:r>
+              <a:rPr lang="en-US" dirty="0" smtClean="0"/>
+              <a:t>We can easily regression test.</a:t>
+            </a:r>
+            <a:endParaRPr lang="en-US" dirty="0"/>
+          </a:p>
+        </p:txBody>
+      </p:sp>
+    </p:spTree>
+    <p:extLst>
+      <p:ext uri="{BB962C8B-B14F-4D97-AF65-F5344CB8AC3E}">
+        <p14:creationId xmlns:p14="http://schemas.microsoft.com/office/powerpoint/2010/main" val="2479422556"/>
+      </p:ext>
+    </p:extLst>
+  </p:cSld>
+  <p:clrMapOvr>
+    <a:masterClrMapping/>
+  </p:clrMapOvr>
+  <p:timing>
+    <p:tnLst>
+      <p:par>
+        <p:cTn id="1" dur="indefinite" restart="never" nodeType="tmRoot"/>
+      </p:par>
+    </p:tnLst>
+  </p:timing>
+</p:sld>
+</file>
+
+<file path=ppt/slides/slide25.xml><?xml version="1.0" encoding="utf-8"?>
+<p:sld xmlns:a="http://schemas.openxmlformats.org/drawingml/2006/main" xmlns:r="http://schemas.openxmlformats.org/officeDocument/2006/relationships" xmlns:p="http://schemas.openxmlformats.org/presentationml/2006/main">
+  <p:cSld>
+    <p:spTree>
+      <p:nvGrpSpPr>
+        <p:cNvPr id="1" name=""/>
+        <p:cNvGrpSpPr/>
+        <p:nvPr/>
+      </p:nvGrpSpPr>
+      <p:grpSpPr>
+        <a:xfrm>
+          <a:off x="0" y="0"/>
+          <a:ext cx="0" cy="0"/>
+          <a:chOff x="0" y="0"/>
+          <a:chExt cx="0" cy="0"/>
+        </a:xfrm>
+      </p:grpSpPr>
+      <p:sp>
+        <p:nvSpPr>
+          <p:cNvPr id="2" name="Title 1"/>
+          <p:cNvSpPr>
+            <a:spLocks noGrp="1"/>
+          </p:cNvSpPr>
+          <p:nvPr>
+            <p:ph type="title"/>
+          </p:nvPr>
+        </p:nvSpPr>
+        <p:spPr/>
+        <p:txBody>
+          <a:bodyPr/>
+          <a:lstStyle/>
+          <a:p>
+            <a:r>
+              <a:rPr lang="en-US" dirty="0" smtClean="0"/>
               <a:t>Summary</a:t>
             </a:r>
             <a:endParaRPr lang="en-US" dirty="0"/>
@@ -33109,7 +33764,7 @@
 </p:sld>
 </file>
 
-<file path=ppt/slides/slide25.xml><?xml version="1.0" encoding="utf-8"?>
+<file path=ppt/slides/slide26.xml><?xml version="1.0" encoding="utf-8"?>
 <p:sld xmlns:a="http://schemas.openxmlformats.org/drawingml/2006/main" xmlns:r="http://schemas.openxmlformats.org/officeDocument/2006/relationships" xmlns:p="http://schemas.openxmlformats.org/presentationml/2006/main">
   <p:cSld>
     <p:spTree>
@@ -33194,7 +33849,7 @@
 </p:sld>
 </file>
 
-<file path=ppt/slides/slide26.xml><?xml version="1.0" encoding="utf-8"?>
+<file path=ppt/slides/slide27.xml><?xml version="1.0" encoding="utf-8"?>
 <p:sld xmlns:a="http://schemas.openxmlformats.org/drawingml/2006/main" xmlns:r="http://schemas.openxmlformats.org/officeDocument/2006/relationships" xmlns:p="http://schemas.openxmlformats.org/presentationml/2006/main">
   <p:cSld>
     <p:spTree>
@@ -33297,7 +33952,7 @@
 </p:sld>
 </file>
 
-<file path=ppt/slides/slide27.xml><?xml version="1.0" encoding="utf-8"?>
+<file path=ppt/slides/slide28.xml><?xml version="1.0" encoding="utf-8"?>
 <p:sld xmlns:a="http://schemas.openxmlformats.org/drawingml/2006/main" xmlns:r="http://schemas.openxmlformats.org/officeDocument/2006/relationships" xmlns:p="http://schemas.openxmlformats.org/presentationml/2006/main">
   <p:cSld>
     <p:spTree>
@@ -33418,7 +34073,7 @@
 </p:sld>
 </file>
 
-<file path=ppt/slides/slide28.xml><?xml version="1.0" encoding="utf-8"?>
+<file path=ppt/slides/slide29.xml><?xml version="1.0" encoding="utf-8"?>
 <p:sld xmlns:a="http://schemas.openxmlformats.org/drawingml/2006/main" xmlns:r="http://schemas.openxmlformats.org/officeDocument/2006/relationships" xmlns:p="http://schemas.openxmlformats.org/presentationml/2006/main">
   <p:cSld>
     <p:spTree>
@@ -34117,85 +34772,6 @@
 </p:sld>
 </file>
 
-<file path=ppt/slides/slide29.xml><?xml version="1.0" encoding="utf-8"?>
-<p:sld xmlns:a="http://schemas.openxmlformats.org/drawingml/2006/main" xmlns:r="http://schemas.openxmlformats.org/officeDocument/2006/relationships" xmlns:p="http://schemas.openxmlformats.org/presentationml/2006/main">
-  <p:cSld>
-    <p:spTree>
-      <p:nvGrpSpPr>
-        <p:cNvPr id="1" name=""/>
-        <p:cNvGrpSpPr/>
-        <p:nvPr/>
-      </p:nvGrpSpPr>
-      <p:grpSpPr>
-        <a:xfrm>
-          <a:off x="0" y="0"/>
-          <a:ext cx="0" cy="0"/>
-          <a:chOff x="0" y="0"/>
-          <a:chExt cx="0" cy="0"/>
-        </a:xfrm>
-      </p:grpSpPr>
-      <p:sp>
-        <p:nvSpPr>
-          <p:cNvPr id="2" name="Title 1"/>
-          <p:cNvSpPr>
-            <a:spLocks noGrp="1"/>
-          </p:cNvSpPr>
-          <p:nvPr>
-            <p:ph type="title"/>
-          </p:nvPr>
-        </p:nvSpPr>
-        <p:spPr/>
-        <p:txBody>
-          <a:bodyPr/>
-          <a:lstStyle/>
-          <a:p>
-            <a:r>
-              <a:rPr lang="en-US" dirty="0" smtClean="0"/>
-              <a:t>Images</a:t>
-            </a:r>
-            <a:endParaRPr lang="en-US" dirty="0"/>
-          </a:p>
-        </p:txBody>
-      </p:sp>
-      <p:sp>
-        <p:nvSpPr>
-          <p:cNvPr id="3" name="Content Placeholder 2"/>
-          <p:cNvSpPr>
-            <a:spLocks noGrp="1"/>
-          </p:cNvSpPr>
-          <p:nvPr>
-            <p:ph idx="1"/>
-          </p:nvPr>
-        </p:nvSpPr>
-        <p:spPr/>
-        <p:txBody>
-          <a:bodyPr/>
-          <a:lstStyle/>
-          <a:p>
-            <a:endParaRPr lang="en-US" dirty="0"/>
-          </a:p>
-        </p:txBody>
-      </p:sp>
-    </p:spTree>
-    <p:extLst>
-      <p:ext uri="{BB962C8B-B14F-4D97-AF65-F5344CB8AC3E}">
-        <p14:creationId xmlns:p14="http://schemas.microsoft.com/office/powerpoint/2010/main" val="2354176993"/>
-      </p:ext>
-    </p:extLst>
-  </p:cSld>
-  <p:clrMapOvr>
-    <a:masterClrMapping/>
-  </p:clrMapOvr>
-  <p:timing>
-    <p:tnLst>
-      <p:par>
-        <p:cTn id="1" dur="indefinite" restart="never" nodeType="tmRoot"/>
-      </p:par>
-    </p:tnLst>
-  </p:timing>
-</p:sld>
-</file>
-
 <file path=ppt/slides/slide3.xml><?xml version="1.0" encoding="utf-8"?>
 <p:sld xmlns:a="http://schemas.openxmlformats.org/drawingml/2006/main" xmlns:r="http://schemas.openxmlformats.org/officeDocument/2006/relationships" xmlns:p="http://schemas.openxmlformats.org/presentationml/2006/main">
   <p:cSld>
@@ -34534,6 +35110,85 @@
           <a:p>
             <a:r>
               <a:rPr lang="en-US" dirty="0" smtClean="0"/>
+              <a:t>Images</a:t>
+            </a:r>
+            <a:endParaRPr lang="en-US" dirty="0"/>
+          </a:p>
+        </p:txBody>
+      </p:sp>
+      <p:sp>
+        <p:nvSpPr>
+          <p:cNvPr id="3" name="Content Placeholder 2"/>
+          <p:cNvSpPr>
+            <a:spLocks noGrp="1"/>
+          </p:cNvSpPr>
+          <p:nvPr>
+            <p:ph idx="1"/>
+          </p:nvPr>
+        </p:nvSpPr>
+        <p:spPr/>
+        <p:txBody>
+          <a:bodyPr/>
+          <a:lstStyle/>
+          <a:p>
+            <a:endParaRPr lang="en-US" dirty="0"/>
+          </a:p>
+        </p:txBody>
+      </p:sp>
+    </p:spTree>
+    <p:extLst>
+      <p:ext uri="{BB962C8B-B14F-4D97-AF65-F5344CB8AC3E}">
+        <p14:creationId xmlns:p14="http://schemas.microsoft.com/office/powerpoint/2010/main" val="2354176993"/>
+      </p:ext>
+    </p:extLst>
+  </p:cSld>
+  <p:clrMapOvr>
+    <a:masterClrMapping/>
+  </p:clrMapOvr>
+  <p:timing>
+    <p:tnLst>
+      <p:par>
+        <p:cTn id="1" dur="indefinite" restart="never" nodeType="tmRoot"/>
+      </p:par>
+    </p:tnLst>
+  </p:timing>
+</p:sld>
+</file>
+
+<file path=ppt/slides/slide31.xml><?xml version="1.0" encoding="utf-8"?>
+<p:sld xmlns:a="http://schemas.openxmlformats.org/drawingml/2006/main" xmlns:r="http://schemas.openxmlformats.org/officeDocument/2006/relationships" xmlns:p="http://schemas.openxmlformats.org/presentationml/2006/main">
+  <p:cSld>
+    <p:spTree>
+      <p:nvGrpSpPr>
+        <p:cNvPr id="1" name=""/>
+        <p:cNvGrpSpPr/>
+        <p:nvPr/>
+      </p:nvGrpSpPr>
+      <p:grpSpPr>
+        <a:xfrm>
+          <a:off x="0" y="0"/>
+          <a:ext cx="0" cy="0"/>
+          <a:chOff x="0" y="0"/>
+          <a:chExt cx="0" cy="0"/>
+        </a:xfrm>
+      </p:grpSpPr>
+      <p:sp>
+        <p:nvSpPr>
+          <p:cNvPr id="2" name="Title 1"/>
+          <p:cNvSpPr>
+            <a:spLocks noGrp="1"/>
+          </p:cNvSpPr>
+          <p:nvPr>
+            <p:ph type="title"/>
+          </p:nvPr>
+        </p:nvSpPr>
+        <p:spPr/>
+        <p:txBody>
+          <a:bodyPr/>
+          <a:lstStyle/>
+          <a:p>
+            <a:r>
+              <a:rPr lang="en-US" dirty="0" smtClean="0"/>
               <a:t>The Continuous Delivery Pipeline</a:t>
             </a:r>
             <a:endParaRPr lang="en-US" dirty="0"/>
@@ -34578,7 +35233,7 @@
 </p:sld>
 </file>
 
-<file path=ppt/slides/slide31.xml><?xml version="1.0" encoding="utf-8"?>
+<file path=ppt/slides/slide32.xml><?xml version="1.0" encoding="utf-8"?>
 <p:sld xmlns:a="http://schemas.openxmlformats.org/drawingml/2006/main" xmlns:r="http://schemas.openxmlformats.org/officeDocument/2006/relationships" xmlns:p="http://schemas.openxmlformats.org/presentationml/2006/main">
   <p:cSld>
     <p:spTree>
@@ -34701,7 +35356,7 @@
 </p:sld>
 </file>
 
-<file path=ppt/slides/slide32.xml><?xml version="1.0" encoding="utf-8"?>
+<file path=ppt/slides/slide33.xml><?xml version="1.0" encoding="utf-8"?>
 <p:sld xmlns:a="http://schemas.openxmlformats.org/drawingml/2006/main" xmlns:r="http://schemas.openxmlformats.org/officeDocument/2006/relationships" xmlns:p="http://schemas.openxmlformats.org/presentationml/2006/main">
   <p:cSld>
     <p:spTree>
@@ -34797,7 +35452,7 @@
 </p:sld>
 </file>
 
-<file path=ppt/slides/slide33.xml><?xml version="1.0" encoding="utf-8"?>
+<file path=ppt/slides/slide34.xml><?xml version="1.0" encoding="utf-8"?>
 <p:sld xmlns:a="http://schemas.openxmlformats.org/drawingml/2006/main" xmlns:r="http://schemas.openxmlformats.org/officeDocument/2006/relationships" xmlns:p="http://schemas.openxmlformats.org/presentationml/2006/main">
   <p:cSld>
     <p:spTree>

</xml_diff>

<commit_message>
Deck Updates for test classes
Added callout for pipeline area on Slide 5. Added details for Test
classes demo
</commit_message>
<xml_diff>
--- a/DB-Delivery-Get-Testing-TSQL.pptx
+++ b/DB-Delivery-Get-Testing-TSQL.pptx
@@ -242,7 +242,7 @@
           <a:p>
             <a:fld id="{3C31BDEC-C855-4A20-BFC3-C78B82093698}" type="datetimeFigureOut">
               <a:rPr lang="en-US" smtClean="0"/>
-              <a:t>5/28/2014</a:t>
+              <a:t>5/29/2014</a:t>
             </a:fld>
             <a:endParaRPr lang="en-US"/>
           </a:p>
@@ -2614,7 +2614,7 @@
             <a:fld id="{1D8BD707-D9CF-40AE-B4C6-C98DA3205C09}" type="datetimeFigureOut">
               <a:rPr lang="en-US" smtClean="0"/>
               <a:pPr/>
-              <a:t>5/28/2014</a:t>
+              <a:t>5/29/2014</a:t>
             </a:fld>
             <a:endParaRPr lang="en-US"/>
           </a:p>
@@ -2781,7 +2781,7 @@
             <a:fld id="{1D8BD707-D9CF-40AE-B4C6-C98DA3205C09}" type="datetimeFigureOut">
               <a:rPr lang="en-US" smtClean="0"/>
               <a:pPr/>
-              <a:t>5/28/2014</a:t>
+              <a:t>5/29/2014</a:t>
             </a:fld>
             <a:endParaRPr lang="en-US"/>
           </a:p>
@@ -2958,7 +2958,7 @@
             <a:fld id="{1D8BD707-D9CF-40AE-B4C6-C98DA3205C09}" type="datetimeFigureOut">
               <a:rPr lang="en-US" smtClean="0"/>
               <a:pPr/>
-              <a:t>5/28/2014</a:t>
+              <a:t>5/29/2014</a:t>
             </a:fld>
             <a:endParaRPr lang="en-US"/>
           </a:p>
@@ -3203,7 +3203,7 @@
                 </a:solidFill>
               </a:rPr>
               <a:pPr/>
-              <a:t>5/28/2014</a:t>
+              <a:t>5/29/2014</a:t>
             </a:fld>
             <a:endParaRPr lang="en-US">
               <a:solidFill>
@@ -3430,7 +3430,7 @@
                 </a:solidFill>
               </a:rPr>
               <a:pPr/>
-              <a:t>5/28/2014</a:t>
+              <a:t>5/29/2014</a:t>
             </a:fld>
             <a:endParaRPr lang="en-US">
               <a:solidFill>
@@ -3708,7 +3708,7 @@
                 </a:solidFill>
               </a:rPr>
               <a:pPr/>
-              <a:t>5/28/2014</a:t>
+              <a:t>5/29/2014</a:t>
             </a:fld>
             <a:endParaRPr lang="en-US">
               <a:solidFill>
@@ -4028,7 +4028,7 @@
                 </a:solidFill>
               </a:rPr>
               <a:pPr/>
-              <a:t>5/28/2014</a:t>
+              <a:t>5/29/2014</a:t>
             </a:fld>
             <a:endParaRPr lang="en-US">
               <a:solidFill>
@@ -4487,7 +4487,7 @@
                 </a:solidFill>
               </a:rPr>
               <a:pPr/>
-              <a:t>5/28/2014</a:t>
+              <a:t>5/29/2014</a:t>
             </a:fld>
             <a:endParaRPr lang="en-US">
               <a:solidFill>
@@ -4637,7 +4637,7 @@
                 </a:solidFill>
               </a:rPr>
               <a:pPr/>
-              <a:t>5/28/2014</a:t>
+              <a:t>5/29/2014</a:t>
             </a:fld>
             <a:endParaRPr lang="en-US">
               <a:solidFill>
@@ -4764,7 +4764,7 @@
                 </a:solidFill>
               </a:rPr>
               <a:pPr/>
-              <a:t>5/28/2014</a:t>
+              <a:t>5/29/2014</a:t>
             </a:fld>
             <a:endParaRPr lang="en-US">
               <a:solidFill>
@@ -5073,7 +5073,7 @@
                 </a:solidFill>
               </a:rPr>
               <a:pPr/>
-              <a:t>5/28/2014</a:t>
+              <a:t>5/29/2014</a:t>
             </a:fld>
             <a:endParaRPr lang="en-US">
               <a:solidFill>
@@ -5269,7 +5269,7 @@
             <a:fld id="{1D8BD707-D9CF-40AE-B4C6-C98DA3205C09}" type="datetimeFigureOut">
               <a:rPr lang="en-US" smtClean="0"/>
               <a:pPr/>
-              <a:t>5/28/2014</a:t>
+              <a:t>5/29/2014</a:t>
             </a:fld>
             <a:endParaRPr lang="en-US"/>
           </a:p>
@@ -5525,7 +5525,7 @@
                 </a:solidFill>
               </a:rPr>
               <a:pPr/>
-              <a:t>5/28/2014</a:t>
+              <a:t>5/29/2014</a:t>
             </a:fld>
             <a:endParaRPr lang="en-US">
               <a:solidFill>
@@ -5727,7 +5727,7 @@
                 </a:solidFill>
               </a:rPr>
               <a:pPr/>
-              <a:t>5/28/2014</a:t>
+              <a:t>5/29/2014</a:t>
             </a:fld>
             <a:endParaRPr lang="en-US">
               <a:solidFill>
@@ -5939,7 +5939,7 @@
                 </a:solidFill>
               </a:rPr>
               <a:pPr/>
-              <a:t>5/28/2014</a:t>
+              <a:t>5/29/2014</a:t>
             </a:fld>
             <a:endParaRPr lang="en-US">
               <a:solidFill>
@@ -6213,7 +6213,7 @@
                 </a:solidFill>
               </a:rPr>
               <a:pPr/>
-              <a:t>5/28/2014</a:t>
+              <a:t>5/29/2014</a:t>
             </a:fld>
             <a:endParaRPr lang="en-US">
               <a:solidFill>
@@ -6440,7 +6440,7 @@
                 </a:solidFill>
               </a:rPr>
               <a:pPr/>
-              <a:t>5/28/2014</a:t>
+              <a:t>5/29/2014</a:t>
             </a:fld>
             <a:endParaRPr lang="en-US">
               <a:solidFill>
@@ -6718,7 +6718,7 @@
                 </a:solidFill>
               </a:rPr>
               <a:pPr/>
-              <a:t>5/28/2014</a:t>
+              <a:t>5/29/2014</a:t>
             </a:fld>
             <a:endParaRPr lang="en-US">
               <a:solidFill>
@@ -7038,7 +7038,7 @@
                 </a:solidFill>
               </a:rPr>
               <a:pPr/>
-              <a:t>5/28/2014</a:t>
+              <a:t>5/29/2014</a:t>
             </a:fld>
             <a:endParaRPr lang="en-US">
               <a:solidFill>
@@ -7497,7 +7497,7 @@
                 </a:solidFill>
               </a:rPr>
               <a:pPr/>
-              <a:t>5/28/2014</a:t>
+              <a:t>5/29/2014</a:t>
             </a:fld>
             <a:endParaRPr lang="en-US">
               <a:solidFill>
@@ -7647,7 +7647,7 @@
                 </a:solidFill>
               </a:rPr>
               <a:pPr/>
-              <a:t>5/28/2014</a:t>
+              <a:t>5/29/2014</a:t>
             </a:fld>
             <a:endParaRPr lang="en-US">
               <a:solidFill>
@@ -7774,7 +7774,7 @@
                 </a:solidFill>
               </a:rPr>
               <a:pPr/>
-              <a:t>5/28/2014</a:t>
+              <a:t>5/29/2014</a:t>
             </a:fld>
             <a:endParaRPr lang="en-US">
               <a:solidFill>
@@ -8046,7 +8046,7 @@
             <a:fld id="{1D8BD707-D9CF-40AE-B4C6-C98DA3205C09}" type="datetimeFigureOut">
               <a:rPr lang="en-US" smtClean="0"/>
               <a:pPr/>
-              <a:t>5/28/2014</a:t>
+              <a:t>5/29/2014</a:t>
             </a:fld>
             <a:endParaRPr lang="en-US"/>
           </a:p>
@@ -8326,7 +8326,7 @@
                 </a:solidFill>
               </a:rPr>
               <a:pPr/>
-              <a:t>5/28/2014</a:t>
+              <a:t>5/29/2014</a:t>
             </a:fld>
             <a:endParaRPr lang="en-US">
               <a:solidFill>
@@ -8611,7 +8611,7 @@
                 </a:solidFill>
               </a:rPr>
               <a:pPr/>
-              <a:t>5/28/2014</a:t>
+              <a:t>5/29/2014</a:t>
             </a:fld>
             <a:endParaRPr lang="en-US">
               <a:solidFill>
@@ -8813,7 +8813,7 @@
                 </a:solidFill>
               </a:rPr>
               <a:pPr/>
-              <a:t>5/28/2014</a:t>
+              <a:t>5/29/2014</a:t>
             </a:fld>
             <a:endParaRPr lang="en-US">
               <a:solidFill>
@@ -9025,7 +9025,7 @@
                 </a:solidFill>
               </a:rPr>
               <a:pPr/>
-              <a:t>5/28/2014</a:t>
+              <a:t>5/29/2014</a:t>
             </a:fld>
             <a:endParaRPr lang="en-US">
               <a:solidFill>
@@ -9299,7 +9299,7 @@
                 </a:solidFill>
               </a:rPr>
               <a:pPr/>
-              <a:t>5/28/2014</a:t>
+              <a:t>5/29/2014</a:t>
             </a:fld>
             <a:endParaRPr lang="en-US">
               <a:solidFill>
@@ -9526,7 +9526,7 @@
                 </a:solidFill>
               </a:rPr>
               <a:pPr/>
-              <a:t>5/28/2014</a:t>
+              <a:t>5/29/2014</a:t>
             </a:fld>
             <a:endParaRPr lang="en-US">
               <a:solidFill>
@@ -9804,7 +9804,7 @@
                 </a:solidFill>
               </a:rPr>
               <a:pPr/>
-              <a:t>5/28/2014</a:t>
+              <a:t>5/29/2014</a:t>
             </a:fld>
             <a:endParaRPr lang="en-US">
               <a:solidFill>
@@ -10124,7 +10124,7 @@
                 </a:solidFill>
               </a:rPr>
               <a:pPr/>
-              <a:t>5/28/2014</a:t>
+              <a:t>5/29/2014</a:t>
             </a:fld>
             <a:endParaRPr lang="en-US">
               <a:solidFill>
@@ -10583,7 +10583,7 @@
                 </a:solidFill>
               </a:rPr>
               <a:pPr/>
-              <a:t>5/28/2014</a:t>
+              <a:t>5/29/2014</a:t>
             </a:fld>
             <a:endParaRPr lang="en-US">
               <a:solidFill>
@@ -10733,7 +10733,7 @@
                 </a:solidFill>
               </a:rPr>
               <a:pPr/>
-              <a:t>5/28/2014</a:t>
+              <a:t>5/29/2014</a:t>
             </a:fld>
             <a:endParaRPr lang="en-US">
               <a:solidFill>
@@ -11047,7 +11047,7 @@
             <a:fld id="{1D8BD707-D9CF-40AE-B4C6-C98DA3205C09}" type="datetimeFigureOut">
               <a:rPr lang="en-US" smtClean="0"/>
               <a:pPr/>
-              <a:t>5/28/2014</a:t>
+              <a:t>5/29/2014</a:t>
             </a:fld>
             <a:endParaRPr lang="en-US"/>
           </a:p>
@@ -11145,7 +11145,7 @@
                 </a:solidFill>
               </a:rPr>
               <a:pPr/>
-              <a:t>5/28/2014</a:t>
+              <a:t>5/29/2014</a:t>
             </a:fld>
             <a:endParaRPr lang="en-US">
               <a:solidFill>
@@ -11454,7 +11454,7 @@
                 </a:solidFill>
               </a:rPr>
               <a:pPr/>
-              <a:t>5/28/2014</a:t>
+              <a:t>5/29/2014</a:t>
             </a:fld>
             <a:endParaRPr lang="en-US">
               <a:solidFill>
@@ -11739,7 +11739,7 @@
                 </a:solidFill>
               </a:rPr>
               <a:pPr/>
-              <a:t>5/28/2014</a:t>
+              <a:t>5/29/2014</a:t>
             </a:fld>
             <a:endParaRPr lang="en-US">
               <a:solidFill>
@@ -11941,7 +11941,7 @@
                 </a:solidFill>
               </a:rPr>
               <a:pPr/>
-              <a:t>5/28/2014</a:t>
+              <a:t>5/29/2014</a:t>
             </a:fld>
             <a:endParaRPr lang="en-US">
               <a:solidFill>
@@ -12153,7 +12153,7 @@
                 </a:solidFill>
               </a:rPr>
               <a:pPr/>
-              <a:t>5/28/2014</a:t>
+              <a:t>5/29/2014</a:t>
             </a:fld>
             <a:endParaRPr lang="en-US">
               <a:solidFill>
@@ -12601,7 +12601,7 @@
             <a:fld id="{1D8BD707-D9CF-40AE-B4C6-C98DA3205C09}" type="datetimeFigureOut">
               <a:rPr lang="en-US" smtClean="0"/>
               <a:pPr/>
-              <a:t>5/28/2014</a:t>
+              <a:t>5/29/2014</a:t>
             </a:fld>
             <a:endParaRPr lang="en-US"/>
           </a:p>
@@ -12716,7 +12716,7 @@
             <a:fld id="{1D8BD707-D9CF-40AE-B4C6-C98DA3205C09}" type="datetimeFigureOut">
               <a:rPr lang="en-US" smtClean="0"/>
               <a:pPr/>
-              <a:t>5/28/2014</a:t>
+              <a:t>5/29/2014</a:t>
             </a:fld>
             <a:endParaRPr lang="en-US"/>
           </a:p>
@@ -12808,7 +12808,7 @@
             <a:fld id="{1D8BD707-D9CF-40AE-B4C6-C98DA3205C09}" type="datetimeFigureOut">
               <a:rPr lang="en-US" smtClean="0"/>
               <a:pPr/>
-              <a:t>5/28/2014</a:t>
+              <a:t>5/29/2014</a:t>
             </a:fld>
             <a:endParaRPr lang="en-US"/>
           </a:p>
@@ -13082,7 +13082,7 @@
             <a:fld id="{1D8BD707-D9CF-40AE-B4C6-C98DA3205C09}" type="datetimeFigureOut">
               <a:rPr lang="en-US" smtClean="0"/>
               <a:pPr/>
-              <a:t>5/28/2014</a:t>
+              <a:t>5/29/2014</a:t>
             </a:fld>
             <a:endParaRPr lang="en-US"/>
           </a:p>
@@ -13332,7 +13332,7 @@
             <a:fld id="{1D8BD707-D9CF-40AE-B4C6-C98DA3205C09}" type="datetimeFigureOut">
               <a:rPr lang="en-US" smtClean="0"/>
               <a:pPr/>
-              <a:t>5/28/2014</a:t>
+              <a:t>5/29/2014</a:t>
             </a:fld>
             <a:endParaRPr lang="en-US"/>
           </a:p>
@@ -13542,7 +13542,7 @@
             <a:fld id="{1D8BD707-D9CF-40AE-B4C6-C98DA3205C09}" type="datetimeFigureOut">
               <a:rPr lang="en-US" smtClean="0"/>
               <a:pPr/>
-              <a:t>5/28/2014</a:t>
+              <a:t>5/29/2014</a:t>
             </a:fld>
             <a:endParaRPr lang="en-US"/>
           </a:p>
@@ -14060,7 +14060,7 @@
                 </a:solidFill>
               </a:rPr>
               <a:pPr defTabSz="609585"/>
-              <a:t>5/28/2014</a:t>
+              <a:t>5/29/2014</a:t>
             </a:fld>
             <a:endParaRPr lang="en-US" dirty="0">
               <a:solidFill>
@@ -14615,7 +14615,7 @@
                 </a:solidFill>
               </a:rPr>
               <a:pPr defTabSz="609585"/>
-              <a:t>5/28/2014</a:t>
+              <a:t>5/29/2014</a:t>
             </a:fld>
             <a:endParaRPr lang="en-US" dirty="0">
               <a:solidFill>
@@ -15170,7 +15170,7 @@
                 </a:solidFill>
               </a:rPr>
               <a:pPr defTabSz="609585"/>
-              <a:t>5/28/2014</a:t>
+              <a:t>5/29/2014</a:t>
             </a:fld>
             <a:endParaRPr lang="en-US" dirty="0">
               <a:solidFill>
@@ -20937,7 +20937,7 @@
         <p:spPr>
           <a:xfrm>
             <a:off x="3612763" y="1752600"/>
-            <a:ext cx="8305800" cy="1634294"/>
+            <a:ext cx="8305800" cy="2822311"/>
           </a:xfrm>
           <a:prstGeom prst="rect">
             <a:avLst/>
@@ -20996,7 +20996,51 @@
                 <a:latin typeface="Arial" panose="020B0604020202020204" pitchFamily="34" charset="0"/>
                 <a:cs typeface="Arial" panose="020B0604020202020204" pitchFamily="34" charset="0"/>
               </a:rPr>
-              <a:t>[TBC]</a:t>
+              <a:t>Grouping Tests by Object</a:t>
+            </a:r>
+          </a:p>
+          <a:p>
+            <a:pPr marL="625475" lvl="1" indent="-625475">
+              <a:spcBef>
+                <a:spcPct val="20000"/>
+              </a:spcBef>
+              <a:spcAft>
+                <a:spcPts val="600"/>
+              </a:spcAft>
+              <a:buClr>
+                <a:srgbClr val="C00000"/>
+              </a:buClr>
+              <a:buFont typeface="Wingdings" panose="05000000000000000000" pitchFamily="2" charset="2"/>
+              <a:buChar char="§"/>
+            </a:pPr>
+            <a:r>
+              <a:rPr lang="en-US" sz="2800" dirty="0" smtClean="0">
+                <a:latin typeface="Arial" panose="020B0604020202020204" pitchFamily="34" charset="0"/>
+                <a:cs typeface="Arial" panose="020B0604020202020204" pitchFamily="34" charset="0"/>
+              </a:rPr>
+              <a:t>Grouping Tests by Suite</a:t>
+            </a:r>
+          </a:p>
+          <a:p>
+            <a:pPr marL="625475" lvl="1" indent="-625475">
+              <a:spcBef>
+                <a:spcPct val="20000"/>
+              </a:spcBef>
+              <a:spcAft>
+                <a:spcPts val="600"/>
+              </a:spcAft>
+              <a:buClr>
+                <a:srgbClr val="C00000"/>
+              </a:buClr>
+              <a:buFont typeface="Wingdings" panose="05000000000000000000" pitchFamily="2" charset="2"/>
+              <a:buChar char="§"/>
+            </a:pPr>
+            <a:r>
+              <a:rPr lang="en-US" sz="2800" dirty="0" smtClean="0">
+                <a:latin typeface="Arial" panose="020B0604020202020204" pitchFamily="34" charset="0"/>
+                <a:cs typeface="Arial" panose="020B0604020202020204" pitchFamily="34" charset="0"/>
+              </a:rPr>
+              <a:t>Executing Groups of Tests</a:t>
             </a:r>
             <a:endParaRPr lang="en-US" sz="2800" dirty="0">
               <a:latin typeface="Arial" panose="020B0604020202020204" pitchFamily="34" charset="0"/>
@@ -22886,7 +22930,7 @@
 </file>
 
 <file path=ppt/slides/slide5.xml><?xml version="1.0" encoding="utf-8"?>
-<p:sld xmlns:a="http://schemas.openxmlformats.org/drawingml/2006/main" xmlns:r="http://schemas.openxmlformats.org/officeDocument/2006/relationships" xmlns:p="http://schemas.openxmlformats.org/presentationml/2006/main" show="0">
+<p:sld xmlns:a="http://schemas.openxmlformats.org/drawingml/2006/main" xmlns:r="http://schemas.openxmlformats.org/officeDocument/2006/relationships" xmlns:p="http://schemas.openxmlformats.org/presentationml/2006/main">
   <p:cSld>
     <p:spTree>
       <p:nvGrpSpPr>
@@ -23022,6 +23066,23 @@
               </a:rPr>
               <a:t>Continuous delivery</a:t>
             </a:r>
+            <a:r>
+              <a:rPr kumimoji="0" lang="en-US" sz="3600" b="1" i="0" u="none" strike="noStrike" kern="1200" cap="none" spc="0" normalizeH="0" noProof="0" dirty="0" smtClean="0">
+                <a:ln>
+                  <a:noFill/>
+                </a:ln>
+                <a:solidFill>
+                  <a:sysClr val="windowText" lastClr="000000"/>
+                </a:solidFill>
+                <a:effectLst/>
+                <a:uLnTx/>
+                <a:uFillTx/>
+                <a:latin typeface="Arial" pitchFamily="34" charset="0"/>
+                <a:ea typeface="+mj-ea"/>
+                <a:cs typeface="+mj-cs"/>
+              </a:rPr>
+              <a:t> – an overview</a:t>
+            </a:r>
             <a:endParaRPr kumimoji="0" lang="en-US" sz="3600" b="1" i="0" u="none" strike="noStrike" kern="1200" cap="none" spc="0" normalizeH="0" baseline="0" noProof="0" dirty="0">
               <a:ln>
                 <a:noFill/>
@@ -23036,6 +23097,48 @@
               <a:ea typeface="+mj-ea"/>
               <a:cs typeface="+mj-cs"/>
             </a:endParaRPr>
+          </a:p>
+        </p:txBody>
+      </p:sp>
+      <p:sp>
+        <p:nvSpPr>
+          <p:cNvPr id="2" name="Rounded Rectangle 1"/>
+          <p:cNvSpPr/>
+          <p:nvPr/>
+        </p:nvSpPr>
+        <p:spPr>
+          <a:xfrm>
+            <a:off x="4648200" y="3962400"/>
+            <a:ext cx="1828800" cy="2514600"/>
+          </a:xfrm>
+          <a:prstGeom prst="roundRect">
+            <a:avLst/>
+          </a:prstGeom>
+          <a:noFill/>
+          <a:ln w="38100"/>
+        </p:spPr>
+        <p:style>
+          <a:lnRef idx="2">
+            <a:schemeClr val="accent1">
+              <a:shade val="50000"/>
+            </a:schemeClr>
+          </a:lnRef>
+          <a:fillRef idx="1">
+            <a:schemeClr val="accent1"/>
+          </a:fillRef>
+          <a:effectRef idx="0">
+            <a:schemeClr val="accent1"/>
+          </a:effectRef>
+          <a:fontRef idx="minor">
+            <a:schemeClr val="lt1"/>
+          </a:fontRef>
+        </p:style>
+        <p:txBody>
+          <a:bodyPr rtlCol="0" anchor="ctr"/>
+          <a:lstStyle/>
+          <a:p>
+            <a:pPr algn="ctr"/>
+            <a:endParaRPr lang="en-GB"/>
           </a:p>
         </p:txBody>
       </p:sp>
@@ -23068,7 +23171,7 @@
 </file>
 
 <file path=ppt/slides/slide6.xml><?xml version="1.0" encoding="utf-8"?>
-<p:sld xmlns:a="http://schemas.openxmlformats.org/drawingml/2006/main" xmlns:r="http://schemas.openxmlformats.org/officeDocument/2006/relationships" xmlns:p="http://schemas.openxmlformats.org/presentationml/2006/main" show="0">
+<p:sld xmlns:a="http://schemas.openxmlformats.org/drawingml/2006/main" xmlns:r="http://schemas.openxmlformats.org/officeDocument/2006/relationships" xmlns:p="http://schemas.openxmlformats.org/presentationml/2006/main">
   <p:cSld>
     <p:spTree>
       <p:nvGrpSpPr>

</xml_diff>